<commit_message>
Update Mini Project Presentation
</commit_message>
<xml_diff>
--- a/College Project/Blog Website with Database/Mini Project Presentation.pptx
+++ b/College Project/Blog Website with Database/Mini Project Presentation.pptx
@@ -12,16 +12,17 @@
     <p:sldId id="260" r:id="rId7"/>
     <p:sldId id="263" r:id="rId8"/>
     <p:sldId id="261" r:id="rId9"/>
-    <p:sldId id="269" r:id="rId10"/>
-    <p:sldId id="271" r:id="rId11"/>
-    <p:sldId id="272" r:id="rId12"/>
-    <p:sldId id="273" r:id="rId13"/>
-    <p:sldId id="270" r:id="rId14"/>
-    <p:sldId id="264" r:id="rId15"/>
-    <p:sldId id="265" r:id="rId16"/>
-    <p:sldId id="266" r:id="rId17"/>
-    <p:sldId id="268" r:id="rId18"/>
-    <p:sldId id="267" r:id="rId19"/>
+    <p:sldId id="274" r:id="rId10"/>
+    <p:sldId id="269" r:id="rId11"/>
+    <p:sldId id="271" r:id="rId12"/>
+    <p:sldId id="272" r:id="rId13"/>
+    <p:sldId id="273" r:id="rId14"/>
+    <p:sldId id="270" r:id="rId15"/>
+    <p:sldId id="264" r:id="rId16"/>
+    <p:sldId id="265" r:id="rId17"/>
+    <p:sldId id="266" r:id="rId18"/>
+    <p:sldId id="268" r:id="rId19"/>
+    <p:sldId id="267" r:id="rId20"/>
   </p:sldIdLst>
   <p:sldSz cx="12192000" cy="6858000"/>
   <p:notesSz cx="6858000" cy="9144000"/>
@@ -556,6 +557,7 @@
         <p:spPr/>
         <p:txBody>
           <a:bodyPr/>
+          <a:lstStyle/>
           <a:p>
             <a:fld id="{63A1C593-65D0-4073-BCC9-577B9352EA97}" type="datetimeFigureOut">
               <a:rPr lang="en-US" smtClean="0"/>
@@ -577,6 +579,7 @@
         <p:spPr/>
         <p:txBody>
           <a:bodyPr/>
+          <a:lstStyle/>
           <a:p>
             <a:endParaRPr lang="en-US"/>
           </a:p>
@@ -595,6 +598,7 @@
         <p:spPr/>
         <p:txBody>
           <a:bodyPr/>
+          <a:lstStyle/>
           <a:p>
             <a:fld id="{9B618960-8005-486C-9A75-10CB2AAC16F9}" type="slidenum">
               <a:rPr lang="en-US" smtClean="0"/>
@@ -731,6 +735,7 @@
         <p:spPr/>
         <p:txBody>
           <a:bodyPr/>
+          <a:lstStyle/>
           <a:p>
             <a:fld id="{63A1C593-65D0-4073-BCC9-577B9352EA97}" type="datetimeFigureOut">
               <a:rPr lang="en-US" smtClean="0"/>
@@ -752,6 +757,7 @@
         <p:spPr/>
         <p:txBody>
           <a:bodyPr/>
+          <a:lstStyle/>
           <a:p>
             <a:endParaRPr lang="en-US"/>
           </a:p>
@@ -770,6 +776,7 @@
         <p:spPr/>
         <p:txBody>
           <a:bodyPr/>
+          <a:lstStyle/>
           <a:p>
             <a:fld id="{9B618960-8005-486C-9A75-10CB2AAC16F9}" type="slidenum">
               <a:rPr lang="en-US" smtClean="0"/>
@@ -896,6 +903,7 @@
         <p:spPr/>
         <p:txBody>
           <a:bodyPr/>
+          <a:lstStyle/>
           <a:p>
             <a:fld id="{63A1C593-65D0-4073-BCC9-577B9352EA97}" type="datetimeFigureOut">
               <a:rPr lang="en-US" smtClean="0"/>
@@ -917,6 +925,7 @@
         <p:spPr/>
         <p:txBody>
           <a:bodyPr/>
+          <a:lstStyle/>
           <a:p>
             <a:endParaRPr lang="en-US"/>
           </a:p>
@@ -935,6 +944,7 @@
         <p:spPr/>
         <p:txBody>
           <a:bodyPr/>
+          <a:lstStyle/>
           <a:p>
             <a:fld id="{9B618960-8005-486C-9A75-10CB2AAC16F9}" type="slidenum">
               <a:rPr lang="en-US" smtClean="0"/>
@@ -1080,6 +1090,7 @@
         <p:spPr/>
         <p:txBody>
           <a:bodyPr/>
+          <a:lstStyle/>
           <a:p>
             <a:fld id="{63A1C593-65D0-4073-BCC9-577B9352EA97}" type="datetimeFigureOut">
               <a:rPr lang="en-US" smtClean="0"/>
@@ -1101,6 +1112,7 @@
         <p:spPr/>
         <p:txBody>
           <a:bodyPr/>
+          <a:lstStyle/>
           <a:p>
             <a:endParaRPr lang="en-US"/>
           </a:p>
@@ -1119,6 +1131,7 @@
         <p:spPr/>
         <p:txBody>
           <a:bodyPr/>
+          <a:lstStyle/>
           <a:p>
             <a:fld id="{9B618960-8005-486C-9A75-10CB2AAC16F9}" type="slidenum">
               <a:rPr lang="en-US" smtClean="0"/>
@@ -1311,6 +1324,7 @@
         <p:spPr/>
         <p:txBody>
           <a:bodyPr/>
+          <a:lstStyle/>
           <a:p>
             <a:fld id="{63A1C593-65D0-4073-BCC9-577B9352EA97}" type="datetimeFigureOut">
               <a:rPr lang="en-US" smtClean="0"/>
@@ -1332,6 +1346,7 @@
         <p:spPr/>
         <p:txBody>
           <a:bodyPr/>
+          <a:lstStyle/>
           <a:p>
             <a:endParaRPr lang="en-US"/>
           </a:p>
@@ -1350,6 +1365,7 @@
         <p:spPr/>
         <p:txBody>
           <a:bodyPr/>
+          <a:lstStyle/>
           <a:p>
             <a:fld id="{9B618960-8005-486C-9A75-10CB2AAC16F9}" type="slidenum">
               <a:rPr lang="en-US" smtClean="0"/>
@@ -1679,6 +1695,7 @@
         <p:spPr/>
         <p:txBody>
           <a:bodyPr/>
+          <a:lstStyle/>
           <a:p>
             <a:fld id="{63A1C593-65D0-4073-BCC9-577B9352EA97}" type="datetimeFigureOut">
               <a:rPr lang="en-US" smtClean="0"/>
@@ -1700,6 +1717,7 @@
         <p:spPr/>
         <p:txBody>
           <a:bodyPr/>
+          <a:lstStyle/>
           <a:p>
             <a:endParaRPr lang="en-US"/>
           </a:p>
@@ -1718,6 +1736,7 @@
         <p:spPr/>
         <p:txBody>
           <a:bodyPr/>
+          <a:lstStyle/>
           <a:p>
             <a:fld id="{9B618960-8005-486C-9A75-10CB2AAC16F9}" type="slidenum">
               <a:rPr lang="en-US" smtClean="0"/>
@@ -1788,6 +1807,7 @@
         <p:spPr/>
         <p:txBody>
           <a:bodyPr/>
+          <a:lstStyle/>
           <a:p>
             <a:fld id="{63A1C593-65D0-4073-BCC9-577B9352EA97}" type="datetimeFigureOut">
               <a:rPr lang="en-US" smtClean="0"/>
@@ -1809,6 +1829,7 @@
         <p:spPr/>
         <p:txBody>
           <a:bodyPr/>
+          <a:lstStyle/>
           <a:p>
             <a:endParaRPr lang="en-US"/>
           </a:p>
@@ -1827,6 +1848,7 @@
         <p:spPr/>
         <p:txBody>
           <a:bodyPr/>
+          <a:lstStyle/>
           <a:p>
             <a:fld id="{9B618960-8005-486C-9A75-10CB2AAC16F9}" type="slidenum">
               <a:rPr lang="en-US" smtClean="0"/>
@@ -1874,6 +1896,7 @@
         <p:spPr/>
         <p:txBody>
           <a:bodyPr/>
+          <a:lstStyle/>
           <a:p>
             <a:fld id="{63A1C593-65D0-4073-BCC9-577B9352EA97}" type="datetimeFigureOut">
               <a:rPr lang="en-US" smtClean="0"/>
@@ -1895,6 +1918,7 @@
         <p:spPr/>
         <p:txBody>
           <a:bodyPr/>
+          <a:lstStyle/>
           <a:p>
             <a:endParaRPr lang="en-US"/>
           </a:p>
@@ -1913,6 +1937,7 @@
         <p:spPr/>
         <p:txBody>
           <a:bodyPr/>
+          <a:lstStyle/>
           <a:p>
             <a:fld id="{9B618960-8005-486C-9A75-10CB2AAC16F9}" type="slidenum">
               <a:rPr lang="en-US" smtClean="0"/>
@@ -2147,6 +2172,7 @@
         <p:spPr/>
         <p:txBody>
           <a:bodyPr/>
+          <a:lstStyle/>
           <a:p>
             <a:fld id="{63A1C593-65D0-4073-BCC9-577B9352EA97}" type="datetimeFigureOut">
               <a:rPr lang="en-US" smtClean="0"/>
@@ -2168,6 +2194,7 @@
         <p:spPr/>
         <p:txBody>
           <a:bodyPr/>
+          <a:lstStyle/>
           <a:p>
             <a:endParaRPr lang="en-US"/>
           </a:p>
@@ -2186,6 +2213,7 @@
         <p:spPr/>
         <p:txBody>
           <a:bodyPr/>
+          <a:lstStyle/>
           <a:p>
             <a:fld id="{9B618960-8005-486C-9A75-10CB2AAC16F9}" type="slidenum">
               <a:rPr lang="en-US" smtClean="0"/>
@@ -2421,6 +2449,7 @@
         <p:spPr/>
         <p:txBody>
           <a:bodyPr/>
+          <a:lstStyle/>
           <a:p>
             <a:fld id="{63A1C593-65D0-4073-BCC9-577B9352EA97}" type="datetimeFigureOut">
               <a:rPr lang="en-US" smtClean="0"/>
@@ -2442,6 +2471,7 @@
         <p:spPr/>
         <p:txBody>
           <a:bodyPr/>
+          <a:lstStyle/>
           <a:p>
             <a:endParaRPr lang="en-US"/>
           </a:p>
@@ -2460,6 +2490,7 @@
         <p:spPr/>
         <p:txBody>
           <a:bodyPr/>
+          <a:lstStyle/>
           <a:p>
             <a:fld id="{9B618960-8005-486C-9A75-10CB2AAC16F9}" type="slidenum">
               <a:rPr lang="en-US" smtClean="0"/>
@@ -2494,7 +2525,14 @@
         <p:cNvGrpSpPr/>
         <p:nvPr/>
       </p:nvGrpSpPr>
-      <p:grpSpPr/>
+      <p:grpSpPr>
+        <a:xfrm>
+          <a:off x="0" y="0"/>
+          <a:ext cx="0" cy="0"/>
+          <a:chOff x="0" y="0"/>
+          <a:chExt cx="0" cy="0"/>
+        </a:xfrm>
+      </p:grpSpPr>
       <p:pic>
         <p:nvPicPr>
           <p:cNvPr id="1026" name="Picture 9"/>
@@ -2548,6 +2586,7 @@
         </p:spPr>
         <p:txBody>
           <a:bodyPr anchor="ctr" anchorCtr="0"/>
+          <a:lstStyle/>
           <a:p>
             <a:pPr lvl="0"/>
             <a:r>
@@ -2583,6 +2622,7 @@
         </p:spPr>
         <p:txBody>
           <a:bodyPr/>
+          <a:lstStyle/>
           <a:p>
             <a:pPr lvl="0"/>
             <a:r>
@@ -3299,6 +3339,7 @@
           <a:bodyPr wrap="square" rtlCol="0">
             <a:spAutoFit/>
           </a:bodyPr>
+          <a:lstStyle/>
           <a:p>
             <a:pPr algn="ctr"/>
             <a:r>
@@ -3353,6 +3394,7 @@
           <a:bodyPr wrap="square" rtlCol="0">
             <a:spAutoFit/>
           </a:bodyPr>
+          <a:lstStyle/>
           <a:p>
             <a:r>
               <a:rPr lang="en-GB" altLang="en-US" sz="2400"/>
@@ -3403,6 +3445,7 @@
           <a:bodyPr wrap="square" rtlCol="0">
             <a:spAutoFit/>
           </a:bodyPr>
+          <a:lstStyle/>
           <a:p>
             <a:r>
               <a:rPr lang="en-GB" altLang="en-US" sz="2400"/>
@@ -3436,7 +3479,14 @@
         <p:cNvGrpSpPr/>
         <p:nvPr/>
       </p:nvGrpSpPr>
-      <p:grpSpPr/>
+      <p:grpSpPr>
+        <a:xfrm>
+          <a:off x="0" y="0"/>
+          <a:ext cx="0" cy="0"/>
+          <a:chOff x="0" y="0"/>
+          <a:chExt cx="0" cy="0"/>
+        </a:xfrm>
+      </p:grpSpPr>
       <p:sp>
         <p:nvSpPr>
           <p:cNvPr id="6" name="Title 5"/>
@@ -3455,6 +3505,108 @@
               <a:lightRig rig="threePt" dir="t"/>
             </a:scene3d>
           </a:bodyPr>
+          <a:lstStyle/>
+          <a:p>
+            <a:r>
+              <a:rPr lang="en-GB" altLang="en-US">
+                <a:solidFill>
+                  <a:schemeClr val="accent1"/>
+                </a:solidFill>
+                <a:effectLst>
+                  <a:outerShdw blurRad="38100" dist="25400" dir="5400000" algn="ctr" rotWithShape="0">
+                    <a:srgbClr val="6E747A">
+                      <a:alpha val="43000"/>
+                    </a:srgbClr>
+                  </a:outerShdw>
+                </a:effectLst>
+              </a:rPr>
+              <a:t>Snapshots</a:t>
+            </a:r>
+            <a:endParaRPr lang="en-GB" altLang="en-US">
+              <a:solidFill>
+                <a:schemeClr val="accent1"/>
+              </a:solidFill>
+              <a:effectLst>
+                <a:outerShdw blurRad="38100" dist="25400" dir="5400000" algn="ctr" rotWithShape="0">
+                  <a:srgbClr val="6E747A">
+                    <a:alpha val="43000"/>
+                  </a:srgbClr>
+                </a:outerShdw>
+              </a:effectLst>
+            </a:endParaRPr>
+          </a:p>
+        </p:txBody>
+      </p:sp>
+      <p:pic>
+        <p:nvPicPr>
+          <p:cNvPr id="9" name="Content Placeholder 8"/>
+          <p:cNvPicPr>
+            <a:picLocks noGrp="1" noChangeAspect="1"/>
+          </p:cNvPicPr>
+          <p:nvPr>
+            <p:ph idx="1"/>
+          </p:nvPr>
+        </p:nvPicPr>
+        <p:blipFill>
+          <a:blip r:embed="rId1"/>
+          <a:stretch>
+            <a:fillRect/>
+          </a:stretch>
+        </p:blipFill>
+        <p:spPr>
+          <a:xfrm>
+            <a:off x="1083310" y="952500"/>
+            <a:ext cx="8688705" cy="5731510"/>
+          </a:xfrm>
+          <a:prstGeom prst="rect">
+            <a:avLst/>
+          </a:prstGeom>
+        </p:spPr>
+      </p:pic>
+    </p:spTree>
+  </p:cSld>
+  <p:clrMapOvr>
+    <a:masterClrMapping/>
+  </p:clrMapOvr>
+</p:sld>
+</file>
+
+<file path=ppt/slides/slide11.xml><?xml version="1.0" encoding="utf-8"?>
+<p:sld xmlns:a="http://schemas.openxmlformats.org/drawingml/2006/main" xmlns:r="http://schemas.openxmlformats.org/officeDocument/2006/relationships" xmlns:p="http://schemas.openxmlformats.org/presentationml/2006/main">
+  <p:cSld>
+    <p:spTree>
+      <p:nvGrpSpPr>
+        <p:cNvPr id="1" name=""/>
+        <p:cNvGrpSpPr/>
+        <p:nvPr/>
+      </p:nvGrpSpPr>
+      <p:grpSpPr>
+        <a:xfrm>
+          <a:off x="0" y="0"/>
+          <a:ext cx="0" cy="0"/>
+          <a:chOff x="0" y="0"/>
+          <a:chExt cx="0" cy="0"/>
+        </a:xfrm>
+      </p:grpSpPr>
+      <p:sp>
+        <p:nvSpPr>
+          <p:cNvPr id="6" name="Title 5"/>
+          <p:cNvSpPr>
+            <a:spLocks noGrp="1"/>
+          </p:cNvSpPr>
+          <p:nvPr>
+            <p:ph type="title"/>
+          </p:nvPr>
+        </p:nvSpPr>
+        <p:spPr/>
+        <p:txBody>
+          <a:bodyPr>
+            <a:scene3d>
+              <a:camera prst="orthographicFront"/>
+              <a:lightRig rig="threePt" dir="t"/>
+            </a:scene3d>
+          </a:bodyPr>
+          <a:lstStyle/>
           <a:p>
             <a:r>
               <a:rPr lang="en-GB" altLang="en-US">
@@ -3490,7 +3642,7 @@
         <p:nvPicPr>
           <p:cNvPr id="7" name="Content Placeholder 6"/>
           <p:cNvPicPr>
-            <a:picLocks noChangeAspect="1"/>
+            <a:picLocks noGrp="1" noChangeAspect="1"/>
           </p:cNvPicPr>
           <p:nvPr>
             <p:ph idx="1"/>
@@ -3520,7 +3672,7 @@
 </p:sld>
 </file>
 
-<file path=ppt/slides/slide11.xml><?xml version="1.0" encoding="utf-8"?>
+<file path=ppt/slides/slide12.xml><?xml version="1.0" encoding="utf-8"?>
 <p:sld xmlns:a="http://schemas.openxmlformats.org/drawingml/2006/main" xmlns:r="http://schemas.openxmlformats.org/officeDocument/2006/relationships" xmlns:p="http://schemas.openxmlformats.org/presentationml/2006/main">
   <p:cSld>
     <p:spTree>
@@ -3529,7 +3681,14 @@
         <p:cNvGrpSpPr/>
         <p:nvPr/>
       </p:nvGrpSpPr>
-      <p:grpSpPr/>
+      <p:grpSpPr>
+        <a:xfrm>
+          <a:off x="0" y="0"/>
+          <a:ext cx="0" cy="0"/>
+          <a:chOff x="0" y="0"/>
+          <a:chExt cx="0" cy="0"/>
+        </a:xfrm>
+      </p:grpSpPr>
       <p:sp>
         <p:nvSpPr>
           <p:cNvPr id="6" name="Title 5"/>
@@ -3548,6 +3707,7 @@
               <a:lightRig rig="threePt" dir="t"/>
             </a:scene3d>
           </a:bodyPr>
+          <a:lstStyle/>
           <a:p>
             <a:r>
               <a:rPr lang="en-GB" altLang="en-US">
@@ -3583,7 +3743,7 @@
         <p:nvPicPr>
           <p:cNvPr id="2" name="Content Placeholder 1"/>
           <p:cNvPicPr>
-            <a:picLocks noChangeAspect="1"/>
+            <a:picLocks noGrp="1" noChangeAspect="1"/>
           </p:cNvPicPr>
           <p:nvPr>
             <p:ph idx="1"/>
@@ -3613,7 +3773,7 @@
 </p:sld>
 </file>
 
-<file path=ppt/slides/slide12.xml><?xml version="1.0" encoding="utf-8"?>
+<file path=ppt/slides/slide13.xml><?xml version="1.0" encoding="utf-8"?>
 <p:sld xmlns:a="http://schemas.openxmlformats.org/drawingml/2006/main" xmlns:r="http://schemas.openxmlformats.org/officeDocument/2006/relationships" xmlns:p="http://schemas.openxmlformats.org/presentationml/2006/main">
   <p:cSld>
     <p:spTree>
@@ -3622,7 +3782,14 @@
         <p:cNvGrpSpPr/>
         <p:nvPr/>
       </p:nvGrpSpPr>
-      <p:grpSpPr/>
+      <p:grpSpPr>
+        <a:xfrm>
+          <a:off x="0" y="0"/>
+          <a:ext cx="0" cy="0"/>
+          <a:chOff x="0" y="0"/>
+          <a:chExt cx="0" cy="0"/>
+        </a:xfrm>
+      </p:grpSpPr>
       <p:sp>
         <p:nvSpPr>
           <p:cNvPr id="2" name="Title 1"/>
@@ -3641,10 +3808,10 @@
         </p:spPr>
         <p:txBody>
           <a:bodyPr/>
+          <a:lstStyle/>
           <a:p>
             <a:r>
               <a:rPr lang="en-GB" altLang="en-US">
-                <a:ln/>
                 <a:solidFill>
                   <a:schemeClr val="accent1"/>
                 </a:solidFill>
@@ -3659,7 +3826,6 @@
               <a:t>Flowchart</a:t>
             </a:r>
             <a:endParaRPr lang="en-GB" altLang="en-US">
-              <a:ln/>
               <a:solidFill>
                 <a:schemeClr val="accent1"/>
               </a:solidFill>
@@ -3709,6 +3875,7 @@
         </p:style>
         <p:txBody>
           <a:bodyPr vert="horz" wrap="none" lIns="91440" tIns="45720" rIns="91440" bIns="45720" numCol="1" anchor="ctr" anchorCtr="0" compatLnSpc="1"/>
+          <a:lstStyle/>
           <a:p>
             <a:pPr marL="0" marR="0" indent="0" algn="ctr" defTabSz="914400" rtl="0" eaLnBrk="1" fontAlgn="base" latinLnBrk="0" hangingPunct="1">
               <a:lnSpc>
@@ -3788,6 +3955,7 @@
         </p:style>
         <p:txBody>
           <a:bodyPr vert="horz" wrap="none" lIns="91440" tIns="45720" rIns="91440" bIns="45720" numCol="1" anchor="ctr" anchorCtr="0" compatLnSpc="1"/>
+          <a:lstStyle/>
           <a:p>
             <a:pPr marL="0" marR="0" indent="0" algn="ctr" defTabSz="914400" rtl="0" eaLnBrk="1" fontAlgn="base" latinLnBrk="0" hangingPunct="1">
               <a:lnSpc>
@@ -3867,6 +4035,7 @@
         </p:style>
         <p:txBody>
           <a:bodyPr vert="horz" wrap="none" lIns="91440" tIns="45720" rIns="91440" bIns="45720" numCol="1" anchor="ctr" anchorCtr="0" compatLnSpc="1"/>
+          <a:lstStyle/>
           <a:p>
             <a:pPr marL="0" marR="0" indent="0" algn="ctr" defTabSz="914400" rtl="0" eaLnBrk="1" fontAlgn="base" latinLnBrk="0" hangingPunct="1">
               <a:lnSpc>
@@ -3988,6 +4157,7 @@
         </p:style>
         <p:txBody>
           <a:bodyPr vert="horz" wrap="none" lIns="91440" tIns="45720" rIns="91440" bIns="45720" numCol="1" anchor="ctr" anchorCtr="0" compatLnSpc="1"/>
+          <a:lstStyle/>
           <a:p>
             <a:pPr marL="0" marR="0" indent="0" algn="ctr" defTabSz="914400" rtl="0" eaLnBrk="1" fontAlgn="base" latinLnBrk="0" hangingPunct="1">
               <a:lnSpc>
@@ -4067,6 +4237,7 @@
         </p:style>
         <p:txBody>
           <a:bodyPr vert="horz" wrap="none" lIns="91440" tIns="45720" rIns="91440" bIns="45720" numCol="1" anchor="ctr" anchorCtr="0" compatLnSpc="1"/>
+          <a:lstStyle/>
           <a:p>
             <a:pPr marL="0" marR="0" indent="0" algn="ctr" defTabSz="914400" rtl="0" eaLnBrk="1" fontAlgn="base" latinLnBrk="0" hangingPunct="1">
               <a:lnSpc>
@@ -4279,12 +4450,13 @@
           <a:bodyPr wrap="square" rtlCol="0">
             <a:spAutoFit/>
           </a:bodyPr>
-          <a:p>
-            <a:r>
-              <a:rPr lang="en-GB" altLang="en-US" sz="1200"/>
+          <a:lstStyle/>
+          <a:p>
+            <a:r>
+              <a:rPr lang="en-GB" altLang="en-US" sz="1200" dirty="0"/>
               <a:t>Read</a:t>
             </a:r>
-            <a:endParaRPr lang="en-GB" altLang="en-US" sz="1200"/>
+            <a:endParaRPr lang="en-GB" altLang="en-US" sz="1200" dirty="0"/>
           </a:p>
         </p:txBody>
       </p:sp>
@@ -4296,7 +4468,7 @@
         </p:nvSpPr>
         <p:spPr>
           <a:xfrm>
-            <a:off x="5895340" y="3108325"/>
+            <a:off x="5895657" y="3136719"/>
             <a:ext cx="1031240" cy="275590"/>
           </a:xfrm>
           <a:prstGeom prst="rect">
@@ -4308,12 +4480,13 @@
           <a:bodyPr wrap="square" rtlCol="0">
             <a:spAutoFit/>
           </a:bodyPr>
-          <a:p>
-            <a:r>
-              <a:rPr lang="en-GB" altLang="en-US" sz="1200"/>
+          <a:lstStyle/>
+          <a:p>
+            <a:r>
+              <a:rPr lang="en-GB" altLang="en-US" sz="1200" dirty="0"/>
               <a:t>Compose</a:t>
             </a:r>
-            <a:endParaRPr lang="en-GB" altLang="en-US" sz="1200"/>
+            <a:endParaRPr lang="en-GB" altLang="en-US" sz="1200" dirty="0"/>
           </a:p>
         </p:txBody>
       </p:sp>
@@ -4325,7 +4498,7 @@
         </p:nvSpPr>
         <p:spPr>
           <a:xfrm>
-            <a:off x="6821805" y="4374515"/>
+            <a:off x="6819900" y="4323080"/>
             <a:ext cx="1748155" cy="779780"/>
           </a:xfrm>
           <a:prstGeom prst="rect">
@@ -4352,6 +4525,7 @@
         </p:style>
         <p:txBody>
           <a:bodyPr vert="horz" wrap="none" lIns="91440" tIns="45720" rIns="91440" bIns="45720" numCol="1" anchor="ctr" anchorCtr="0" compatLnSpc="1"/>
+          <a:lstStyle/>
           <a:p>
             <a:pPr marL="0" marR="0" indent="0" algn="ctr" defTabSz="914400" rtl="0" eaLnBrk="1" fontAlgn="base" latinLnBrk="0" hangingPunct="1">
               <a:lnSpc>
@@ -4407,8 +4581,8 @@
         </p:nvCxnSpPr>
         <p:spPr>
           <a:xfrm>
-            <a:off x="7677785" y="3931285"/>
-            <a:ext cx="18415" cy="443230"/>
+            <a:off x="7677468" y="3931285"/>
+            <a:ext cx="16510" cy="391795"/>
           </a:xfrm>
           <a:prstGeom prst="straightConnector1">
             <a:avLst/>
@@ -4444,12 +4618,12 @@
         </p:nvCxnSpPr>
         <p:spPr>
           <a:xfrm flipH="1" flipV="1">
-            <a:off x="5920105" y="2266950"/>
-            <a:ext cx="2649855" cy="2497455"/>
+            <a:off x="5920105" y="2266633"/>
+            <a:ext cx="2647950" cy="2446337"/>
           </a:xfrm>
           <a:prstGeom prst="bentConnector3">
             <a:avLst>
-              <a:gd name="adj1" fmla="val -8986"/>
+              <a:gd name="adj1" fmla="val -8633"/>
             </a:avLst>
           </a:prstGeom>
           <a:ln>
@@ -4476,20 +4650,18 @@
         <p:nvCxnSpPr>
           <p:cNvPr id="18" name="Elbow Connector 17"/>
           <p:cNvCxnSpPr>
-            <a:stCxn id="6" idx="1"/>
+            <a:stCxn id="6" idx="0"/>
             <a:endCxn id="4" idx="1"/>
           </p:cNvCxnSpPr>
           <p:nvPr/>
         </p:nvCxnSpPr>
         <p:spPr>
-          <a:xfrm rot="10800000" flipH="1">
-            <a:off x="1377950" y="2266950"/>
-            <a:ext cx="2470150" cy="1253490"/>
+          <a:xfrm rot="5400000" flipH="1" flipV="1">
+            <a:off x="2570798" y="1858963"/>
+            <a:ext cx="869632" cy="1684972"/>
           </a:xfrm>
-          <a:prstGeom prst="bentConnector3">
-            <a:avLst>
-              <a:gd name="adj1" fmla="val -9640"/>
-            </a:avLst>
+          <a:prstGeom prst="bentConnector2">
+            <a:avLst/>
           </a:prstGeom>
           <a:ln>
             <a:headEnd type="none" w="med" len="med"/>
@@ -4546,6 +4718,7 @@
         </p:style>
         <p:txBody>
           <a:bodyPr vert="horz" wrap="none" lIns="91440" tIns="45720" rIns="91440" bIns="45720" numCol="1" anchor="ctr" anchorCtr="0" compatLnSpc="1"/>
+          <a:lstStyle/>
           <a:p>
             <a:pPr marL="0" marR="0" indent="0" algn="ctr" defTabSz="914400" rtl="0" eaLnBrk="1" fontAlgn="base" latinLnBrk="0" hangingPunct="1">
               <a:lnSpc>
@@ -4601,8 +4774,8 @@
         </p:nvCxnSpPr>
         <p:spPr>
           <a:xfrm flipH="1">
-            <a:off x="7686675" y="5154295"/>
-            <a:ext cx="9525" cy="367665"/>
+            <a:off x="7686675" y="5102860"/>
+            <a:ext cx="7303" cy="419100"/>
           </a:xfrm>
           <a:prstGeom prst="straightConnector1">
             <a:avLst/>
@@ -4647,6 +4820,7 @@
           <a:bodyPr wrap="square" rtlCol="0">
             <a:spAutoFit/>
           </a:bodyPr>
+          <a:lstStyle/>
           <a:p>
             <a:r>
               <a:rPr lang="en-GB" altLang="en-US" sz="1200"/>
@@ -4676,6 +4850,7 @@
           <a:bodyPr wrap="square" rtlCol="0">
             <a:spAutoFit/>
           </a:bodyPr>
+          <a:lstStyle/>
           <a:p>
             <a:r>
               <a:rPr lang="en-GB" altLang="en-US" sz="1200"/>
@@ -4685,90 +4860,361 @@
           </a:p>
         </p:txBody>
       </p:sp>
-    </p:spTree>
-  </p:cSld>
-  <p:clrMapOvr>
-    <a:masterClrMapping/>
-  </p:clrMapOvr>
-</p:sld>
-</file>
-
-<file path=ppt/slides/slide13.xml><?xml version="1.0" encoding="utf-8"?>
-<p:sld xmlns:a="http://schemas.openxmlformats.org/drawingml/2006/main" xmlns:r="http://schemas.openxmlformats.org/officeDocument/2006/relationships" xmlns:p="http://schemas.openxmlformats.org/presentationml/2006/main">
-  <p:cSld>
-    <p:spTree>
-      <p:nvGrpSpPr>
-        <p:cNvPr id="1" name=""/>
-        <p:cNvGrpSpPr/>
-        <p:nvPr/>
-      </p:nvGrpSpPr>
-      <p:grpSpPr/>
-      <p:sp>
-        <p:nvSpPr>
-          <p:cNvPr id="2" name="Title 1"/>
-          <p:cNvSpPr>
-            <a:spLocks noGrp="1"/>
-          </p:cNvSpPr>
-          <p:nvPr>
-            <p:ph type="title"/>
-          </p:nvPr>
+      <p:sp>
+        <p:nvSpPr>
+          <p:cNvPr id="25" name="Diamond 24"/>
+          <p:cNvSpPr/>
+          <p:nvPr/>
+        </p:nvSpPr>
+        <p:spPr bwMode="auto">
+          <a:xfrm>
+            <a:off x="1384209" y="4151267"/>
+            <a:ext cx="1572986" cy="1123406"/>
+          </a:xfrm>
+          <a:prstGeom prst="diamond">
+            <a:avLst/>
+          </a:prstGeom>
+          <a:ln>
+            <a:headEnd type="none" w="med" len="med"/>
+            <a:tailEnd type="none" w="med" len="med"/>
+          </a:ln>
+        </p:spPr>
+        <p:style>
+          <a:lnRef idx="2">
+            <a:schemeClr val="dk1"/>
+          </a:lnRef>
+          <a:fillRef idx="1">
+            <a:schemeClr val="lt1"/>
+          </a:fillRef>
+          <a:effectRef idx="0">
+            <a:schemeClr val="dk1"/>
+          </a:effectRef>
+          <a:fontRef idx="minor">
+            <a:schemeClr val="dk1"/>
+          </a:fontRef>
+        </p:style>
+        <p:txBody>
+          <a:bodyPr vert="horz" wrap="none" lIns="91440" tIns="45720" rIns="91440" bIns="45720" numCol="1" rtlCol="0" anchor="ctr" anchorCtr="0" compatLnSpc="1"/>
+          <a:lstStyle/>
+          <a:p>
+            <a:pPr marL="0" marR="0" indent="0" algn="ctr" defTabSz="914400" rtl="0" eaLnBrk="1" fontAlgn="base" latinLnBrk="0" hangingPunct="1">
+              <a:lnSpc>
+                <a:spcPct val="100000"/>
+              </a:lnSpc>
+              <a:spcBef>
+                <a:spcPct val="0"/>
+              </a:spcBef>
+              <a:spcAft>
+                <a:spcPct val="0"/>
+              </a:spcAft>
+              <a:buClrTx/>
+              <a:buSzTx/>
+              <a:buFontTx/>
+              <a:buNone/>
+            </a:pPr>
+            <a:r>
+              <a:rPr lang="en-US" dirty="0" smtClean="0">
+                <a:solidFill>
+                  <a:schemeClr val="tx1"/>
+                </a:solidFill>
+                <a:latin typeface="Arial" panose="020B0604020202020204" pitchFamily="34" charset="0"/>
+                <a:ea typeface="SimSun" panose="02010600030101010101" pitchFamily="2" charset="-122"/>
+              </a:rPr>
+              <a:t>Delete ?</a:t>
+            </a:r>
+            <a:endParaRPr kumimoji="0" lang="en-US" sz="1800" b="0" i="0" u="none" strike="noStrike" cap="none" normalizeH="0" baseline="0" dirty="0" smtClean="0">
+              <a:ln>
+                <a:noFill/>
+              </a:ln>
+              <a:solidFill>
+                <a:schemeClr val="tx1"/>
+              </a:solidFill>
+              <a:effectLst/>
+              <a:latin typeface="Arial" panose="020B0604020202020204" pitchFamily="34" charset="0"/>
+              <a:ea typeface="SimSun" panose="02010600030101010101" pitchFamily="2" charset="-122"/>
+            </a:endParaRPr>
+          </a:p>
+        </p:txBody>
+      </p:sp>
+      <p:cxnSp>
+        <p:nvCxnSpPr>
+          <p:cNvPr id="27" name="Straight Arrow Connector 26"/>
+          <p:cNvCxnSpPr>
+            <a:stCxn id="6" idx="2"/>
+            <a:endCxn id="25" idx="0"/>
+          </p:cNvCxnSpPr>
+          <p:nvPr/>
+        </p:nvCxnSpPr>
+        <p:spPr bwMode="auto">
+          <a:xfrm>
+            <a:off x="2163128" y="3903980"/>
+            <a:ext cx="7574" cy="247287"/>
+          </a:xfrm>
+          <a:prstGeom prst="straightConnector1">
+            <a:avLst/>
+          </a:prstGeom>
+          <a:ln>
+            <a:headEnd type="none" w="med" len="med"/>
+            <a:tailEnd type="triangle"/>
+          </a:ln>
+        </p:spPr>
+        <p:style>
+          <a:lnRef idx="1">
+            <a:schemeClr val="dk1"/>
+          </a:lnRef>
+          <a:fillRef idx="0">
+            <a:schemeClr val="dk1"/>
+          </a:fillRef>
+          <a:effectRef idx="0">
+            <a:schemeClr val="dk1"/>
+          </a:effectRef>
+          <a:fontRef idx="minor">
+            <a:schemeClr val="tx1"/>
+          </a:fontRef>
+        </p:style>
+      </p:cxnSp>
+      <p:sp>
+        <p:nvSpPr>
+          <p:cNvPr id="28" name="Rectangle 27"/>
+          <p:cNvSpPr/>
+          <p:nvPr/>
+        </p:nvSpPr>
+        <p:spPr bwMode="auto">
+          <a:xfrm>
+            <a:off x="1362279" y="5521960"/>
+            <a:ext cx="1610791" cy="704669"/>
+          </a:xfrm>
+          <a:prstGeom prst="rect">
+            <a:avLst/>
+          </a:prstGeom>
+          <a:ln>
+            <a:headEnd type="none" w="med" len="med"/>
+            <a:tailEnd type="none" w="med" len="med"/>
+          </a:ln>
+        </p:spPr>
+        <p:style>
+          <a:lnRef idx="2">
+            <a:schemeClr val="dk1"/>
+          </a:lnRef>
+          <a:fillRef idx="1">
+            <a:schemeClr val="lt1"/>
+          </a:fillRef>
+          <a:effectRef idx="0">
+            <a:schemeClr val="dk1"/>
+          </a:effectRef>
+          <a:fontRef idx="minor">
+            <a:schemeClr val="dk1"/>
+          </a:fontRef>
+        </p:style>
+        <p:txBody>
+          <a:bodyPr vert="horz" wrap="none" lIns="91440" tIns="45720" rIns="91440" bIns="45720" numCol="1" rtlCol="0" anchor="ctr" anchorCtr="0" compatLnSpc="1"/>
+          <a:lstStyle/>
+          <a:p>
+            <a:pPr marL="0" marR="0" indent="0" algn="ctr" defTabSz="914400" rtl="0" eaLnBrk="1" fontAlgn="base" latinLnBrk="0" hangingPunct="1">
+              <a:lnSpc>
+                <a:spcPct val="100000"/>
+              </a:lnSpc>
+              <a:spcBef>
+                <a:spcPct val="0"/>
+              </a:spcBef>
+              <a:spcAft>
+                <a:spcPct val="0"/>
+              </a:spcAft>
+              <a:buClrTx/>
+              <a:buSzTx/>
+              <a:buFontTx/>
+              <a:buNone/>
+            </a:pPr>
+            <a:r>
+              <a:rPr kumimoji="0" lang="en-US" sz="1800" b="0" i="0" u="none" strike="noStrike" cap="none" normalizeH="0" baseline="0" dirty="0" smtClean="0">
+                <a:ln>
+                  <a:noFill/>
+                </a:ln>
+                <a:solidFill>
+                  <a:schemeClr val="tx1"/>
+                </a:solidFill>
+                <a:effectLst/>
+                <a:latin typeface="Arial" panose="020B0604020202020204" pitchFamily="34" charset="0"/>
+                <a:ea typeface="SimSun" panose="02010600030101010101" pitchFamily="2" charset="-122"/>
+              </a:rPr>
+              <a:t>Delete</a:t>
+            </a:r>
+            <a:endParaRPr kumimoji="0" lang="en-US" sz="1800" b="0" i="0" u="none" strike="noStrike" cap="none" normalizeH="0" baseline="0" dirty="0" smtClean="0">
+              <a:ln>
+                <a:noFill/>
+              </a:ln>
+              <a:solidFill>
+                <a:schemeClr val="tx1"/>
+              </a:solidFill>
+              <a:effectLst/>
+              <a:latin typeface="Arial" panose="020B0604020202020204" pitchFamily="34" charset="0"/>
+              <a:ea typeface="SimSun" panose="02010600030101010101" pitchFamily="2" charset="-122"/>
+            </a:endParaRPr>
+          </a:p>
+        </p:txBody>
+      </p:sp>
+      <p:cxnSp>
+        <p:nvCxnSpPr>
+          <p:cNvPr id="34" name="Straight Arrow Connector 33"/>
+          <p:cNvCxnSpPr>
+            <a:stCxn id="25" idx="2"/>
+            <a:endCxn id="28" idx="0"/>
+          </p:cNvCxnSpPr>
+          <p:nvPr/>
+        </p:nvCxnSpPr>
+        <p:spPr bwMode="auto">
+          <a:xfrm flipH="1">
+            <a:off x="2167675" y="5274673"/>
+            <a:ext cx="3027" cy="247287"/>
+          </a:xfrm>
+          <a:prstGeom prst="straightConnector1">
+            <a:avLst/>
+          </a:prstGeom>
+          <a:ln>
+            <a:headEnd type="none" w="med" len="med"/>
+            <a:tailEnd type="triangle"/>
+          </a:ln>
+        </p:spPr>
+        <p:style>
+          <a:lnRef idx="1">
+            <a:schemeClr val="dk1"/>
+          </a:lnRef>
+          <a:fillRef idx="0">
+            <a:schemeClr val="dk1"/>
+          </a:fillRef>
+          <a:effectRef idx="0">
+            <a:schemeClr val="dk1"/>
+          </a:effectRef>
+          <a:fontRef idx="minor">
+            <a:schemeClr val="tx1"/>
+          </a:fontRef>
+        </p:style>
+      </p:cxnSp>
+      <p:cxnSp>
+        <p:nvCxnSpPr>
+          <p:cNvPr id="36" name="Straight Arrow Connector 35"/>
+          <p:cNvCxnSpPr>
+            <a:stCxn id="28" idx="3"/>
+            <a:endCxn id="19" idx="1"/>
+          </p:cNvCxnSpPr>
+          <p:nvPr/>
+        </p:nvCxnSpPr>
+        <p:spPr bwMode="auto">
+          <a:xfrm flipV="1">
+            <a:off x="2973070" y="5827078"/>
+            <a:ext cx="3895725" cy="47217"/>
+          </a:xfrm>
+          <a:prstGeom prst="straightConnector1">
+            <a:avLst/>
+          </a:prstGeom>
+          <a:ln>
+            <a:headEnd type="none" w="med" len="med"/>
+            <a:tailEnd type="triangle"/>
+          </a:ln>
+        </p:spPr>
+        <p:style>
+          <a:lnRef idx="1">
+            <a:schemeClr val="dk1"/>
+          </a:lnRef>
+          <a:fillRef idx="0">
+            <a:schemeClr val="dk1"/>
+          </a:fillRef>
+          <a:effectRef idx="0">
+            <a:schemeClr val="dk1"/>
+          </a:effectRef>
+          <a:fontRef idx="minor">
+            <a:schemeClr val="tx1"/>
+          </a:fontRef>
+        </p:style>
+      </p:cxnSp>
+      <p:cxnSp>
+        <p:nvCxnSpPr>
+          <p:cNvPr id="42" name="Elbow Connector 41"/>
+          <p:cNvCxnSpPr>
+            <a:stCxn id="28" idx="1"/>
+            <a:endCxn id="6" idx="1"/>
+          </p:cNvCxnSpPr>
+          <p:nvPr/>
+        </p:nvCxnSpPr>
+        <p:spPr bwMode="auto">
+          <a:xfrm rot="10800000" flipH="1">
+            <a:off x="1362278" y="3520123"/>
+            <a:ext cx="15671" cy="2354172"/>
+          </a:xfrm>
+          <a:prstGeom prst="bentConnector3">
+            <a:avLst>
+              <a:gd name="adj1" fmla="val -2792457"/>
+            </a:avLst>
+          </a:prstGeom>
+          <a:ln>
+            <a:headEnd type="none" w="med" len="med"/>
+            <a:tailEnd type="triangle"/>
+          </a:ln>
+        </p:spPr>
+        <p:style>
+          <a:lnRef idx="1">
+            <a:schemeClr val="dk1"/>
+          </a:lnRef>
+          <a:fillRef idx="0">
+            <a:schemeClr val="dk1"/>
+          </a:fillRef>
+          <a:effectRef idx="0">
+            <a:schemeClr val="dk1"/>
+          </a:effectRef>
+          <a:fontRef idx="minor">
+            <a:schemeClr val="tx1"/>
+          </a:fontRef>
+        </p:style>
+      </p:cxnSp>
+      <p:cxnSp>
+        <p:nvCxnSpPr>
+          <p:cNvPr id="52" name="Elbow Connector 51"/>
+          <p:cNvCxnSpPr>
+            <a:stCxn id="25" idx="3"/>
+          </p:cNvCxnSpPr>
+          <p:nvPr/>
+        </p:nvCxnSpPr>
+        <p:spPr bwMode="auto">
+          <a:xfrm flipH="1" flipV="1">
+            <a:off x="2778034" y="3903980"/>
+            <a:ext cx="179161" cy="808990"/>
+          </a:xfrm>
+          <a:prstGeom prst="bentConnector4">
+            <a:avLst>
+              <a:gd name="adj1" fmla="val -166481"/>
+              <a:gd name="adj2" fmla="val 84716"/>
+            </a:avLst>
+          </a:prstGeom>
+          <a:ln>
+            <a:headEnd type="none" w="med" len="med"/>
+            <a:tailEnd type="triangle"/>
+          </a:ln>
+        </p:spPr>
+        <p:style>
+          <a:lnRef idx="1">
+            <a:schemeClr val="dk1"/>
+          </a:lnRef>
+          <a:fillRef idx="0">
+            <a:schemeClr val="dk1"/>
+          </a:fillRef>
+          <a:effectRef idx="0">
+            <a:schemeClr val="dk1"/>
+          </a:effectRef>
+          <a:fontRef idx="minor">
+            <a:schemeClr val="tx1"/>
+          </a:fontRef>
+        </p:style>
+      </p:cxnSp>
+      <p:sp>
+        <p:nvSpPr>
+          <p:cNvPr id="56" name="TextBox 55"/>
+          <p:cNvSpPr txBox="1"/>
+          <p:nvPr/>
         </p:nvSpPr>
         <p:spPr>
           <a:xfrm>
-            <a:off x="609600" y="769620"/>
-            <a:ext cx="10972800" cy="582613"/>
-          </a:xfrm>
-        </p:spPr>
-        <p:txBody>
-          <a:bodyPr>
-            <a:scene3d>
-              <a:camera prst="orthographicFront"/>
-              <a:lightRig rig="threePt" dir="t"/>
-            </a:scene3d>
-          </a:bodyPr>
-          <a:p>
-            <a:r>
-              <a:rPr lang="en-GB" altLang="en-US">
-                <a:ln/>
-                <a:solidFill>
-                  <a:schemeClr val="accent1"/>
-                </a:solidFill>
-                <a:effectLst>
-                  <a:outerShdw blurRad="38100" dist="25400" dir="5400000" algn="ctr" rotWithShape="0">
-                    <a:srgbClr val="6E747A">
-                      <a:alpha val="43000"/>
-                    </a:srgbClr>
-                  </a:outerShdw>
-                </a:effectLst>
-              </a:rPr>
-              <a:t>Benefits of Blog Website</a:t>
-            </a:r>
-            <a:endParaRPr lang="en-GB" altLang="en-US">
-              <a:ln/>
-              <a:solidFill>
-                <a:schemeClr val="accent1"/>
-              </a:solidFill>
-              <a:effectLst>
-                <a:outerShdw blurRad="38100" dist="25400" dir="5400000" algn="ctr" rotWithShape="0">
-                  <a:srgbClr val="6E747A">
-                    <a:alpha val="43000"/>
-                  </a:srgbClr>
-                </a:outerShdw>
-              </a:effectLst>
-            </a:endParaRPr>
-          </a:p>
-        </p:txBody>
-      </p:sp>
-      <p:sp>
-        <p:nvSpPr>
-          <p:cNvPr id="3" name="Text Box 2"/>
-          <p:cNvSpPr txBox="1"/>
-          <p:nvPr/>
-        </p:nvSpPr>
-        <p:spPr>
-          <a:xfrm>
-            <a:off x="876300" y="1591945"/>
-            <a:ext cx="7771130" cy="4338320"/>
+            <a:off x="3259838" y="4248964"/>
+            <a:ext cx="380232" cy="276999"/>
           </a:xfrm>
           <a:prstGeom prst="rect">
             <a:avLst/>
@@ -4776,184 +5222,46 @@
           <a:noFill/>
         </p:spPr>
         <p:txBody>
-          <a:bodyPr wrap="square" rtlCol="0">
+          <a:bodyPr wrap="none" rtlCol="0">
             <a:spAutoFit/>
           </a:bodyPr>
-          <a:p>
-            <a:pPr indent="0">
-              <a:lnSpc>
-                <a:spcPct val="100000"/>
-              </a:lnSpc>
-              <a:buFont typeface="Wingdings" panose="05000000000000000000" charset="0"/>
-              <a:buNone/>
-            </a:pPr>
-            <a:r>
-              <a:rPr lang="en-GB" altLang="en-US" sz="2400">
-                <a:ln/>
-                <a:solidFill>
-                  <a:schemeClr val="tx1"/>
-                </a:solidFill>
-                <a:effectLst>
-                  <a:outerShdw blurRad="38100" dist="19050" dir="2700000" algn="tl" rotWithShape="0">
-                    <a:schemeClr val="dk1">
-                      <a:alpha val="40000"/>
-                    </a:schemeClr>
-                  </a:outerShdw>
-                </a:effectLst>
-              </a:rPr>
-              <a:t>Freedom to write</a:t>
-            </a:r>
-            <a:endParaRPr lang="en-GB" altLang="en-US" sz="2000"/>
-          </a:p>
-          <a:p>
-            <a:pPr indent="0">
-              <a:lnSpc>
-                <a:spcPct val="100000"/>
-              </a:lnSpc>
-              <a:buFont typeface="Wingdings" panose="05000000000000000000" charset="0"/>
-              <a:buNone/>
-            </a:pPr>
-            <a:r>
-              <a:rPr lang="en-GB" altLang="en-US" sz="2000"/>
-              <a:t>	Blogs are reflection of writer’s thoughts. The writer can 	express themselve freely. It attracts relevent people to the 	website.</a:t>
-            </a:r>
-            <a:endParaRPr lang="en-GB" altLang="en-US" sz="2000"/>
-          </a:p>
-          <a:p>
-            <a:pPr indent="0">
-              <a:lnSpc>
-                <a:spcPct val="100000"/>
-              </a:lnSpc>
-              <a:buFont typeface="Wingdings" panose="05000000000000000000" charset="0"/>
-              <a:buNone/>
-            </a:pPr>
-            <a:endParaRPr lang="en-GB" altLang="en-US" sz="2000"/>
-          </a:p>
-          <a:p>
-            <a:pPr indent="0">
-              <a:lnSpc>
-                <a:spcPct val="100000"/>
-              </a:lnSpc>
-              <a:buFont typeface="Wingdings" panose="05000000000000000000" charset="0"/>
-              <a:buNone/>
-            </a:pPr>
-            <a:r>
-              <a:rPr lang="en-GB" altLang="en-US" sz="2400">
-                <a:ln/>
-                <a:solidFill>
-                  <a:schemeClr val="tx1"/>
-                </a:solidFill>
-                <a:effectLst>
-                  <a:outerShdw blurRad="38100" dist="19050" dir="2700000" algn="tl" rotWithShape="0">
-                    <a:schemeClr val="dk1">
-                      <a:alpha val="40000"/>
-                    </a:schemeClr>
-                  </a:outerShdw>
-                </a:effectLst>
-              </a:rPr>
-              <a:t>Use as Diary</a:t>
-            </a:r>
-            <a:endParaRPr lang="en-GB" altLang="en-US" sz="2400">
-              <a:ln/>
-              <a:solidFill>
-                <a:schemeClr val="tx1"/>
-              </a:solidFill>
-              <a:effectLst>
-                <a:outerShdw blurRad="38100" dist="19050" dir="2700000" algn="tl" rotWithShape="0">
-                  <a:schemeClr val="dk1">
-                    <a:alpha val="40000"/>
-                  </a:schemeClr>
-                </a:outerShdw>
-              </a:effectLst>
-            </a:endParaRPr>
-          </a:p>
-          <a:p>
-            <a:pPr indent="0">
-              <a:lnSpc>
-                <a:spcPct val="100000"/>
-              </a:lnSpc>
-              <a:buFont typeface="Wingdings" panose="05000000000000000000" charset="0"/>
-              <a:buNone/>
-            </a:pPr>
-            <a:r>
-              <a:rPr lang="en-GB" altLang="en-US" sz="2000"/>
-              <a:t>	The blogs appear in chronological order so we can update 	daily events as a story on blog website.</a:t>
-            </a:r>
-            <a:endParaRPr lang="en-GB" altLang="en-US" sz="2000"/>
-          </a:p>
-          <a:p>
-            <a:pPr indent="0">
-              <a:lnSpc>
-                <a:spcPct val="100000"/>
-              </a:lnSpc>
-              <a:buFont typeface="Wingdings" panose="05000000000000000000" charset="0"/>
-              <a:buNone/>
-            </a:pPr>
-            <a:endParaRPr lang="en-GB" altLang="en-US" sz="2400">
-              <a:ln/>
-              <a:solidFill>
-                <a:schemeClr val="tx1"/>
-              </a:solidFill>
-              <a:effectLst>
-                <a:outerShdw blurRad="38100" dist="19050" dir="2700000" algn="tl" rotWithShape="0">
-                  <a:schemeClr val="dk1">
-                    <a:alpha val="40000"/>
-                  </a:schemeClr>
-                </a:outerShdw>
-              </a:effectLst>
-            </a:endParaRPr>
-          </a:p>
-          <a:p>
-            <a:pPr indent="0">
-              <a:lnSpc>
-                <a:spcPct val="100000"/>
-              </a:lnSpc>
-              <a:buFont typeface="Wingdings" panose="05000000000000000000" charset="0"/>
-              <a:buNone/>
-            </a:pPr>
-            <a:r>
-              <a:rPr lang="en-GB" altLang="en-US" sz="2400">
-                <a:ln/>
-                <a:solidFill>
-                  <a:schemeClr val="tx1"/>
-                </a:solidFill>
-                <a:effectLst>
-                  <a:outerShdw blurRad="38100" dist="19050" dir="2700000" algn="tl" rotWithShape="0">
-                    <a:schemeClr val="dk1">
-                      <a:alpha val="40000"/>
-                    </a:schemeClr>
-                  </a:outerShdw>
-                </a:effectLst>
-              </a:rPr>
-              <a:t>Connect with Others</a:t>
-            </a:r>
-            <a:endParaRPr lang="en-GB" altLang="en-US" sz="2400">
-              <a:ln/>
-              <a:solidFill>
-                <a:schemeClr val="tx1"/>
-              </a:solidFill>
-              <a:effectLst>
-                <a:outerShdw blurRad="38100" dist="19050" dir="2700000" algn="tl" rotWithShape="0">
-                  <a:schemeClr val="dk1">
-                    <a:alpha val="40000"/>
-                  </a:schemeClr>
-                </a:outerShdw>
-              </a:effectLst>
-            </a:endParaRPr>
-          </a:p>
-          <a:p>
-            <a:pPr indent="0">
-              <a:lnSpc>
-                <a:spcPct val="100000"/>
-              </a:lnSpc>
-              <a:buFont typeface="Wingdings" panose="05000000000000000000" charset="0"/>
-              <a:buNone/>
-            </a:pPr>
-            <a:r>
-              <a:rPr lang="en-GB" altLang="en-US" sz="2000"/>
-              <a:t>	Readers can comment their opinion on the respective 	blogs hence we get the feedback from others. We can also 	interect with them.</a:t>
-            </a:r>
-            <a:endParaRPr lang="en-GB" altLang="en-US" sz="2000"/>
+          <a:lstStyle/>
+          <a:p>
+            <a:r>
+              <a:rPr lang="en-US" sz="1200" dirty="0" smtClean="0"/>
+              <a:t>No</a:t>
+            </a:r>
+            <a:endParaRPr lang="en-US" sz="1200" dirty="0"/>
+          </a:p>
+        </p:txBody>
+      </p:sp>
+      <p:sp>
+        <p:nvSpPr>
+          <p:cNvPr id="57" name="TextBox 56"/>
+          <p:cNvSpPr txBox="1"/>
+          <p:nvPr/>
+        </p:nvSpPr>
+        <p:spPr>
+          <a:xfrm>
+            <a:off x="2257247" y="5193459"/>
+            <a:ext cx="435056" cy="276999"/>
+          </a:xfrm>
+          <a:prstGeom prst="rect">
+            <a:avLst/>
+          </a:prstGeom>
+          <a:noFill/>
+        </p:spPr>
+        <p:txBody>
+          <a:bodyPr wrap="none" rtlCol="0">
+            <a:spAutoFit/>
+          </a:bodyPr>
+          <a:lstStyle/>
+          <a:p>
+            <a:r>
+              <a:rPr lang="en-US" sz="1200" dirty="0" smtClean="0"/>
+              <a:t>Yes</a:t>
+            </a:r>
+            <a:endParaRPr lang="en-US" sz="1200" dirty="0"/>
           </a:p>
         </p:txBody>
       </p:sp>
@@ -4974,7 +5282,14 @@
         <p:cNvGrpSpPr/>
         <p:nvPr/>
       </p:nvGrpSpPr>
-      <p:grpSpPr/>
+      <p:grpSpPr>
+        <a:xfrm>
+          <a:off x="0" y="0"/>
+          <a:ext cx="0" cy="0"/>
+          <a:chOff x="0" y="0"/>
+          <a:chExt cx="0" cy="0"/>
+        </a:xfrm>
+      </p:grpSpPr>
       <p:sp>
         <p:nvSpPr>
           <p:cNvPr id="2" name="Title 1"/>
@@ -4987,7 +5302,7 @@
         </p:nvSpPr>
         <p:spPr>
           <a:xfrm>
-            <a:off x="609600" y="736600"/>
+            <a:off x="609600" y="769620"/>
             <a:ext cx="10972800" cy="582613"/>
           </a:xfrm>
         </p:spPr>
@@ -4998,10 +5313,10 @@
               <a:lightRig rig="threePt" dir="t"/>
             </a:scene3d>
           </a:bodyPr>
+          <a:lstStyle/>
           <a:p>
             <a:r>
               <a:rPr lang="en-GB" altLang="en-US">
-                <a:ln/>
                 <a:solidFill>
                   <a:schemeClr val="accent1"/>
                 </a:solidFill>
@@ -5013,10 +5328,9 @@
                   </a:outerShdw>
                 </a:effectLst>
               </a:rPr>
-              <a:t>Applications of Blog Website</a:t>
+              <a:t>Benefits of Blog Website</a:t>
             </a:r>
             <a:endParaRPr lang="en-GB" altLang="en-US">
-              <a:ln/>
               <a:solidFill>
                 <a:schemeClr val="accent1"/>
               </a:solidFill>
@@ -5039,8 +5353,8 @@
         </p:nvSpPr>
         <p:spPr>
           <a:xfrm>
-            <a:off x="955040" y="1569720"/>
-            <a:ext cx="7447915" cy="4646295"/>
+            <a:off x="876300" y="1591945"/>
+            <a:ext cx="7771130" cy="4338320"/>
           </a:xfrm>
           <a:prstGeom prst="rect">
             <a:avLst/>
@@ -5051,10 +5365,17 @@
           <a:bodyPr wrap="square" rtlCol="0">
             <a:spAutoFit/>
           </a:bodyPr>
-          <a:p>
-            <a:r>
-              <a:rPr lang="en-GB" altLang="en-US" sz="2400">
-                <a:ln/>
+          <a:lstStyle/>
+          <a:p>
+            <a:pPr indent="0">
+              <a:lnSpc>
+                <a:spcPct val="100000"/>
+              </a:lnSpc>
+              <a:buFont typeface="Wingdings" panose="05000000000000000000" charset="0"/>
+              <a:buNone/>
+            </a:pPr>
+            <a:r>
+              <a:rPr lang="en-GB" altLang="en-US" sz="2400" dirty="0">
                 <a:solidFill>
                   <a:schemeClr val="tx1"/>
                 </a:solidFill>
@@ -5066,10 +5387,100 @@
                   </a:outerShdw>
                 </a:effectLst>
               </a:rPr>
-              <a:t>Advertisement</a:t>
-            </a:r>
-            <a:endParaRPr lang="en-GB" altLang="en-US" sz="2400">
-              <a:ln/>
+              <a:t>Freedom to write</a:t>
+            </a:r>
+            <a:endParaRPr lang="en-GB" altLang="en-US" sz="2000" dirty="0"/>
+          </a:p>
+          <a:p>
+            <a:pPr indent="0">
+              <a:lnSpc>
+                <a:spcPct val="100000"/>
+              </a:lnSpc>
+              <a:buFont typeface="Wingdings" panose="05000000000000000000" charset="0"/>
+              <a:buNone/>
+            </a:pPr>
+            <a:r>
+              <a:rPr lang="en-GB" altLang="en-US" sz="2000" dirty="0"/>
+              <a:t>	Blogs are reflection of writer’s thoughts. The writer can 	express </a:t>
+            </a:r>
+            <a:r>
+              <a:rPr lang="en-GB" altLang="en-US" sz="2000" dirty="0" smtClean="0"/>
+              <a:t>themselves </a:t>
+            </a:r>
+            <a:r>
+              <a:rPr lang="en-GB" altLang="en-US" sz="2000" dirty="0"/>
+              <a:t>freely. It attracts </a:t>
+            </a:r>
+            <a:r>
+              <a:rPr lang="en-GB" altLang="en-US" sz="2000" dirty="0" smtClean="0"/>
+              <a:t>relevant </a:t>
+            </a:r>
+            <a:r>
+              <a:rPr lang="en-GB" altLang="en-US" sz="2000" dirty="0"/>
+              <a:t>people </a:t>
+            </a:r>
+            <a:r>
+              <a:rPr lang="en-GB" altLang="en-US" sz="2000" dirty="0" smtClean="0"/>
+              <a:t>to</a:t>
+            </a:r>
+            <a:endParaRPr lang="en-GB" altLang="en-US" sz="2000" dirty="0" smtClean="0"/>
+          </a:p>
+          <a:p>
+            <a:pPr indent="0">
+              <a:lnSpc>
+                <a:spcPct val="100000"/>
+              </a:lnSpc>
+              <a:buFont typeface="Wingdings" panose="05000000000000000000" charset="0"/>
+              <a:buNone/>
+            </a:pPr>
+            <a:r>
+              <a:rPr lang="en-GB" altLang="en-US" sz="2000" dirty="0"/>
+              <a:t>	</a:t>
+            </a:r>
+            <a:r>
+              <a:rPr lang="en-GB" altLang="en-US" sz="2000" dirty="0" smtClean="0"/>
+              <a:t>the website</a:t>
+            </a:r>
+            <a:r>
+              <a:rPr lang="en-GB" altLang="en-US" sz="2000" dirty="0"/>
+              <a:t>.</a:t>
+            </a:r>
+            <a:endParaRPr lang="en-GB" altLang="en-US" sz="2000" dirty="0"/>
+          </a:p>
+          <a:p>
+            <a:pPr indent="0">
+              <a:lnSpc>
+                <a:spcPct val="100000"/>
+              </a:lnSpc>
+              <a:buFont typeface="Wingdings" panose="05000000000000000000" charset="0"/>
+              <a:buNone/>
+            </a:pPr>
+            <a:endParaRPr lang="en-GB" altLang="en-US" sz="2000" dirty="0"/>
+          </a:p>
+          <a:p>
+            <a:pPr indent="0">
+              <a:lnSpc>
+                <a:spcPct val="100000"/>
+              </a:lnSpc>
+              <a:buFont typeface="Wingdings" panose="05000000000000000000" charset="0"/>
+              <a:buNone/>
+            </a:pPr>
+            <a:r>
+              <a:rPr lang="en-GB" altLang="en-US" sz="2400" dirty="0">
+                <a:solidFill>
+                  <a:schemeClr val="tx1"/>
+                </a:solidFill>
+                <a:effectLst>
+                  <a:outerShdw blurRad="38100" dist="19050" dir="2700000" algn="tl" rotWithShape="0">
+                    <a:schemeClr val="dk1">
+                      <a:alpha val="40000"/>
+                    </a:schemeClr>
+                  </a:outerShdw>
+                </a:effectLst>
+              </a:rPr>
+              <a:t>Use as Diary</a:t>
+            </a:r>
+            <a:endParaRPr lang="en-GB" altLang="en-US" sz="2400" dirty="0">
               <a:solidFill>
                 <a:schemeClr val="tx1"/>
               </a:solidFill>
@@ -5083,23 +5494,50 @@
             </a:endParaRPr>
           </a:p>
           <a:p>
-            <a:r>
-              <a:rPr lang="en-GB" altLang="en-US" sz="2400"/>
-              <a:t>	</a:t>
-            </a:r>
-            <a:r>
-              <a:rPr lang="en-GB" altLang="en-US" sz="2000"/>
-              <a:t>We can show advertisement on our blog website inorder 	to redirect the audience to any sales website and make 	them buy product and services</a:t>
-            </a:r>
-            <a:endParaRPr lang="en-GB" altLang="en-US" sz="2000"/>
-          </a:p>
-          <a:p>
-            <a:endParaRPr lang="en-GB" altLang="en-US" sz="2000"/>
-          </a:p>
-          <a:p>
-            <a:r>
-              <a:rPr lang="en-GB" altLang="en-US" sz="2400">
-                <a:ln/>
+            <a:pPr indent="0">
+              <a:lnSpc>
+                <a:spcPct val="100000"/>
+              </a:lnSpc>
+              <a:buFont typeface="Wingdings" panose="05000000000000000000" charset="0"/>
+              <a:buNone/>
+            </a:pPr>
+            <a:r>
+              <a:rPr lang="en-GB" altLang="en-US" sz="2000" dirty="0"/>
+              <a:t>	The blogs appear in chronological order so we can update 	daily events as a story on blog website.</a:t>
+            </a:r>
+            <a:endParaRPr lang="en-GB" altLang="en-US" sz="2000" dirty="0"/>
+          </a:p>
+          <a:p>
+            <a:pPr indent="0">
+              <a:lnSpc>
+                <a:spcPct val="100000"/>
+              </a:lnSpc>
+              <a:buFont typeface="Wingdings" panose="05000000000000000000" charset="0"/>
+              <a:buNone/>
+            </a:pPr>
+            <a:endParaRPr lang="en-GB" altLang="en-US" sz="2400" dirty="0">
+              <a:solidFill>
+                <a:schemeClr val="tx1"/>
+              </a:solidFill>
+              <a:effectLst>
+                <a:outerShdw blurRad="38100" dist="19050" dir="2700000" algn="tl" rotWithShape="0">
+                  <a:schemeClr val="dk1">
+                    <a:alpha val="40000"/>
+                  </a:schemeClr>
+                </a:outerShdw>
+              </a:effectLst>
+            </a:endParaRPr>
+          </a:p>
+          <a:p>
+            <a:pPr indent="0">
+              <a:lnSpc>
+                <a:spcPct val="100000"/>
+              </a:lnSpc>
+              <a:buFont typeface="Wingdings" panose="05000000000000000000" charset="0"/>
+              <a:buNone/>
+            </a:pPr>
+            <a:r>
+              <a:rPr lang="en-GB" altLang="en-US" sz="2400" dirty="0">
                 <a:solidFill>
                   <a:schemeClr val="tx1"/>
                 </a:solidFill>
@@ -5111,10 +5549,9 @@
                   </a:outerShdw>
                 </a:effectLst>
               </a:rPr>
-              <a:t>Marketing</a:t>
-            </a:r>
-            <a:endParaRPr lang="en-GB" altLang="en-US" sz="2400">
-              <a:ln/>
+              <a:t>Connect with Others</a:t>
+            </a:r>
+            <a:endParaRPr lang="en-GB" altLang="en-US" sz="2400" dirty="0">
               <a:solidFill>
                 <a:schemeClr val="tx1"/>
               </a:solidFill>
@@ -5128,52 +5565,26 @@
             </a:endParaRPr>
           </a:p>
           <a:p>
-            <a:r>
-              <a:rPr lang="en-GB" altLang="en-US" sz="2000"/>
-              <a:t>	Marketers can use blog websites to promote and sell 	their products. They can do reviews of their latest 	products and services on the website.</a:t>
-            </a:r>
-            <a:endParaRPr lang="en-GB" altLang="en-US" sz="2000"/>
-          </a:p>
-          <a:p>
-            <a:endParaRPr lang="en-GB" altLang="en-US" sz="2000"/>
-          </a:p>
-          <a:p>
-            <a:r>
-              <a:rPr lang="en-GB" altLang="en-US" sz="2400">
-                <a:ln/>
-                <a:solidFill>
-                  <a:schemeClr val="tx1"/>
-                </a:solidFill>
-                <a:effectLst>
-                  <a:outerShdw blurRad="38100" dist="19050" dir="2700000" algn="tl" rotWithShape="0">
-                    <a:schemeClr val="dk1">
-                      <a:alpha val="40000"/>
-                    </a:schemeClr>
-                  </a:outerShdw>
-                </a:effectLst>
-              </a:rPr>
-              <a:t>Share Knowledge</a:t>
-            </a:r>
-            <a:endParaRPr lang="en-GB" altLang="en-US" sz="2400">
-              <a:ln/>
-              <a:solidFill>
-                <a:schemeClr val="tx1"/>
-              </a:solidFill>
-              <a:effectLst>
-                <a:outerShdw blurRad="38100" dist="19050" dir="2700000" algn="tl" rotWithShape="0">
-                  <a:schemeClr val="dk1">
-                    <a:alpha val="40000"/>
-                  </a:schemeClr>
-                </a:outerShdw>
-              </a:effectLst>
-            </a:endParaRPr>
-          </a:p>
-          <a:p>
-            <a:r>
-              <a:rPr lang="en-GB" altLang="en-US" sz="2000"/>
-              <a:t>	Blog website can be run by anyone so it gives the 	freedom to share the knowledge in whatever topic he or 	she want to. </a:t>
-            </a:r>
-            <a:endParaRPr lang="en-GB" altLang="en-US" sz="2000"/>
+            <a:pPr indent="0">
+              <a:lnSpc>
+                <a:spcPct val="100000"/>
+              </a:lnSpc>
+              <a:buFont typeface="Wingdings" panose="05000000000000000000" charset="0"/>
+              <a:buNone/>
+            </a:pPr>
+            <a:r>
+              <a:rPr lang="en-GB" altLang="en-US" sz="2000" dirty="0"/>
+              <a:t>	Readers can comment their opinion on the respective 	blogs hence we get the feedback from others. We can also 	</a:t>
+            </a:r>
+            <a:r>
+              <a:rPr lang="en-GB" altLang="en-US" sz="2000" dirty="0" smtClean="0"/>
+              <a:t>interact </a:t>
+            </a:r>
+            <a:r>
+              <a:rPr lang="en-GB" altLang="en-US" sz="2000" dirty="0"/>
+              <a:t>with them.</a:t>
+            </a:r>
+            <a:endParaRPr lang="en-GB" altLang="en-US" sz="2000" dirty="0"/>
           </a:p>
         </p:txBody>
       </p:sp>
@@ -5194,7 +5605,14 @@
         <p:cNvGrpSpPr/>
         <p:nvPr/>
       </p:nvGrpSpPr>
-      <p:grpSpPr/>
+      <p:grpSpPr>
+        <a:xfrm>
+          <a:off x="0" y="0"/>
+          <a:ext cx="0" cy="0"/>
+          <a:chOff x="0" y="0"/>
+          <a:chExt cx="0" cy="0"/>
+        </a:xfrm>
+      </p:grpSpPr>
       <p:sp>
         <p:nvSpPr>
           <p:cNvPr id="2" name="Title 1"/>
@@ -5207,7 +5625,7 @@
         </p:nvSpPr>
         <p:spPr>
           <a:xfrm>
-            <a:off x="609600" y="902970"/>
+            <a:off x="609600" y="736600"/>
             <a:ext cx="10972800" cy="582613"/>
           </a:xfrm>
         </p:spPr>
@@ -5218,10 +5636,10 @@
               <a:lightRig rig="threePt" dir="t"/>
             </a:scene3d>
           </a:bodyPr>
+          <a:lstStyle/>
           <a:p>
             <a:r>
               <a:rPr lang="en-GB" altLang="en-US">
-                <a:ln/>
                 <a:solidFill>
                   <a:schemeClr val="accent1"/>
                 </a:solidFill>
@@ -5233,10 +5651,9 @@
                   </a:outerShdw>
                 </a:effectLst>
               </a:rPr>
-              <a:t>Conclusion</a:t>
+              <a:t>Applications of Blog Website</a:t>
             </a:r>
             <a:endParaRPr lang="en-GB" altLang="en-US">
-              <a:ln/>
               <a:solidFill>
                 <a:schemeClr val="accent1"/>
               </a:solidFill>
@@ -5259,8 +5676,8 @@
         </p:nvSpPr>
         <p:spPr>
           <a:xfrm>
-            <a:off x="732155" y="1870075"/>
-            <a:ext cx="8494395" cy="2553335"/>
+            <a:off x="955040" y="1569720"/>
+            <a:ext cx="7447915" cy="4646295"/>
           </a:xfrm>
           <a:prstGeom prst="rect">
             <a:avLst/>
@@ -5271,52 +5688,140 @@
           <a:bodyPr wrap="square" rtlCol="0">
             <a:spAutoFit/>
           </a:bodyPr>
-          <a:p>
-            <a:pPr marL="342900" indent="-342900">
-              <a:buFont typeface="Wingdings" panose="05000000000000000000" charset="0"/>
-              <a:buChar char="Ø"/>
-            </a:pPr>
-            <a:r>
-              <a:rPr lang="en-GB" altLang="en-US" sz="2000"/>
-              <a:t>A blog is a frequently updated online personal journal or diary. It is a place to express yourself to the world.</a:t>
-            </a:r>
-            <a:endParaRPr lang="en-GB" altLang="en-US" sz="2000"/>
-          </a:p>
-          <a:p>
-            <a:pPr marL="342900" indent="-342900">
-              <a:buFont typeface="Wingdings" panose="05000000000000000000" charset="0"/>
-              <a:buChar char="Ø"/>
-            </a:pPr>
-            <a:endParaRPr lang="en-GB" altLang="en-US" sz="2000"/>
-          </a:p>
-          <a:p>
-            <a:pPr marL="342900" indent="-342900">
-              <a:buFont typeface="Wingdings" panose="05000000000000000000" charset="0"/>
-              <a:buChar char="Ø"/>
-            </a:pPr>
-            <a:r>
-              <a:rPr lang="en-GB" altLang="en-US" sz="2000"/>
-              <a:t>A place to share your thoughts and your passions. Really, it’s anything you want it to be.</a:t>
-            </a:r>
-            <a:endParaRPr lang="en-GB" altLang="en-US" sz="2000"/>
-          </a:p>
-          <a:p>
-            <a:pPr marL="342900" indent="-342900">
-              <a:buFont typeface="Wingdings" panose="05000000000000000000" charset="0"/>
-              <a:buChar char="Ø"/>
-            </a:pPr>
-            <a:endParaRPr lang="en-GB" altLang="en-US" sz="2000"/>
-          </a:p>
-          <a:p>
-            <a:pPr marL="342900" indent="-342900">
-              <a:buFont typeface="Wingdings" panose="05000000000000000000" charset="0"/>
-              <a:buChar char="Ø"/>
-            </a:pPr>
-            <a:r>
-              <a:rPr lang="en-GB" altLang="en-US" sz="2000"/>
-              <a:t>For our purposes we’ll say that a blog is your own website that you are going to update on an ongoing basis.</a:t>
-            </a:r>
-            <a:endParaRPr lang="en-GB" altLang="en-US" sz="2000"/>
+          <a:lstStyle/>
+          <a:p>
+            <a:r>
+              <a:rPr lang="en-GB" altLang="en-US" sz="2400" dirty="0">
+                <a:solidFill>
+                  <a:schemeClr val="tx1"/>
+                </a:solidFill>
+                <a:effectLst>
+                  <a:outerShdw blurRad="38100" dist="19050" dir="2700000" algn="tl" rotWithShape="0">
+                    <a:schemeClr val="dk1">
+                      <a:alpha val="40000"/>
+                    </a:schemeClr>
+                  </a:outerShdw>
+                </a:effectLst>
+              </a:rPr>
+              <a:t>Advertisement</a:t>
+            </a:r>
+            <a:endParaRPr lang="en-GB" altLang="en-US" sz="2400" dirty="0">
+              <a:solidFill>
+                <a:schemeClr val="tx1"/>
+              </a:solidFill>
+              <a:effectLst>
+                <a:outerShdw blurRad="38100" dist="19050" dir="2700000" algn="tl" rotWithShape="0">
+                  <a:schemeClr val="dk1">
+                    <a:alpha val="40000"/>
+                  </a:schemeClr>
+                </a:outerShdw>
+              </a:effectLst>
+            </a:endParaRPr>
+          </a:p>
+          <a:p>
+            <a:r>
+              <a:rPr lang="en-GB" altLang="en-US" sz="2400" dirty="0"/>
+              <a:t>	</a:t>
+            </a:r>
+            <a:r>
+              <a:rPr lang="en-GB" altLang="en-US" sz="2000" dirty="0"/>
+              <a:t>We can show advertisement on our blog website </a:t>
+            </a:r>
+            <a:r>
+              <a:rPr lang="en-GB" altLang="en-US" sz="2000" dirty="0" err="1" smtClean="0"/>
+              <a:t>inorder</a:t>
+            </a:r>
+            <a:r>
+              <a:rPr lang="en-GB" altLang="en-US" sz="2000" dirty="0" smtClean="0"/>
+              <a:t> </a:t>
+            </a:r>
+            <a:r>
+              <a:rPr lang="en-GB" altLang="en-US" sz="2000" dirty="0"/>
+              <a:t>	to redirect the audience to any sales website and make 	them buy product and </a:t>
+            </a:r>
+            <a:r>
+              <a:rPr lang="en-GB" altLang="en-US" sz="2000" dirty="0" smtClean="0"/>
+              <a:t>services.</a:t>
+            </a:r>
+            <a:endParaRPr lang="en-GB" altLang="en-US" sz="2000" dirty="0"/>
+          </a:p>
+          <a:p>
+            <a:endParaRPr lang="en-GB" altLang="en-US" sz="2000" dirty="0"/>
+          </a:p>
+          <a:p>
+            <a:r>
+              <a:rPr lang="en-GB" altLang="en-US" sz="2400" dirty="0">
+                <a:solidFill>
+                  <a:schemeClr val="tx1"/>
+                </a:solidFill>
+                <a:effectLst>
+                  <a:outerShdw blurRad="38100" dist="19050" dir="2700000" algn="tl" rotWithShape="0">
+                    <a:schemeClr val="dk1">
+                      <a:alpha val="40000"/>
+                    </a:schemeClr>
+                  </a:outerShdw>
+                </a:effectLst>
+              </a:rPr>
+              <a:t>Marketing</a:t>
+            </a:r>
+            <a:endParaRPr lang="en-GB" altLang="en-US" sz="2400" dirty="0">
+              <a:solidFill>
+                <a:schemeClr val="tx1"/>
+              </a:solidFill>
+              <a:effectLst>
+                <a:outerShdw blurRad="38100" dist="19050" dir="2700000" algn="tl" rotWithShape="0">
+                  <a:schemeClr val="dk1">
+                    <a:alpha val="40000"/>
+                  </a:schemeClr>
+                </a:outerShdw>
+              </a:effectLst>
+            </a:endParaRPr>
+          </a:p>
+          <a:p>
+            <a:r>
+              <a:rPr lang="en-GB" altLang="en-US" sz="2000" dirty="0"/>
+              <a:t>	Marketers can use blog websites to promote and sell 	their products. They can do reviews of their latest 	products and services on the website.</a:t>
+            </a:r>
+            <a:endParaRPr lang="en-GB" altLang="en-US" sz="2000" dirty="0"/>
+          </a:p>
+          <a:p>
+            <a:endParaRPr lang="en-GB" altLang="en-US" sz="2000" dirty="0"/>
+          </a:p>
+          <a:p>
+            <a:r>
+              <a:rPr lang="en-GB" altLang="en-US" sz="2400" dirty="0">
+                <a:solidFill>
+                  <a:schemeClr val="tx1"/>
+                </a:solidFill>
+                <a:effectLst>
+                  <a:outerShdw blurRad="38100" dist="19050" dir="2700000" algn="tl" rotWithShape="0">
+                    <a:schemeClr val="dk1">
+                      <a:alpha val="40000"/>
+                    </a:schemeClr>
+                  </a:outerShdw>
+                </a:effectLst>
+              </a:rPr>
+              <a:t>Share Knowledge</a:t>
+            </a:r>
+            <a:endParaRPr lang="en-GB" altLang="en-US" sz="2400" dirty="0">
+              <a:solidFill>
+                <a:schemeClr val="tx1"/>
+              </a:solidFill>
+              <a:effectLst>
+                <a:outerShdw blurRad="38100" dist="19050" dir="2700000" algn="tl" rotWithShape="0">
+                  <a:schemeClr val="dk1">
+                    <a:alpha val="40000"/>
+                  </a:schemeClr>
+                </a:outerShdw>
+              </a:effectLst>
+            </a:endParaRPr>
+          </a:p>
+          <a:p>
+            <a:r>
+              <a:rPr lang="en-GB" altLang="en-US" sz="2000" dirty="0"/>
+              <a:t>	Blog website can be run by anyone so it gives the 	freedom to share the knowledge in whatever topic he or 	she want to. </a:t>
+            </a:r>
+            <a:endParaRPr lang="en-GB" altLang="en-US" sz="2000" dirty="0"/>
           </a:p>
         </p:txBody>
       </p:sp>
@@ -5337,7 +5842,14 @@
         <p:cNvGrpSpPr/>
         <p:nvPr/>
       </p:nvGrpSpPr>
-      <p:grpSpPr/>
+      <p:grpSpPr>
+        <a:xfrm>
+          <a:off x="0" y="0"/>
+          <a:ext cx="0" cy="0"/>
+          <a:chOff x="0" y="0"/>
+          <a:chExt cx="0" cy="0"/>
+        </a:xfrm>
+      </p:grpSpPr>
       <p:sp>
         <p:nvSpPr>
           <p:cNvPr id="2" name="Title 1"/>
@@ -5350,7 +5862,7 @@
         </p:nvSpPr>
         <p:spPr>
           <a:xfrm>
-            <a:off x="609600" y="457200"/>
+            <a:off x="609600" y="902970"/>
             <a:ext cx="10972800" cy="582613"/>
           </a:xfrm>
         </p:spPr>
@@ -5361,10 +5873,10 @@
               <a:lightRig rig="threePt" dir="t"/>
             </a:scene3d>
           </a:bodyPr>
+          <a:lstStyle/>
           <a:p>
             <a:r>
               <a:rPr lang="en-GB" altLang="en-US">
-                <a:ln/>
                 <a:solidFill>
                   <a:schemeClr val="accent1"/>
                 </a:solidFill>
@@ -5376,10 +5888,9 @@
                   </a:outerShdw>
                 </a:effectLst>
               </a:rPr>
-              <a:t>References</a:t>
+              <a:t>Conclusion</a:t>
             </a:r>
             <a:endParaRPr lang="en-GB" altLang="en-US">
-              <a:ln/>
               <a:solidFill>
                 <a:schemeClr val="accent1"/>
               </a:solidFill>
@@ -5402,8 +5913,8 @@
         </p:nvSpPr>
         <p:spPr>
           <a:xfrm>
-            <a:off x="788035" y="1146175"/>
-            <a:ext cx="7893685" cy="3692525"/>
+            <a:off x="732155" y="1843948"/>
+            <a:ext cx="8494395" cy="2553335"/>
           </a:xfrm>
           <a:prstGeom prst="rect">
             <a:avLst/>
@@ -5414,207 +5925,53 @@
           <a:bodyPr wrap="square" rtlCol="0">
             <a:spAutoFit/>
           </a:bodyPr>
+          <a:lstStyle/>
           <a:p>
             <a:pPr marL="342900" indent="-342900">
-              <a:buFont typeface="+mj-lt"/>
-              <a:buAutoNum type="arabicPeriod"/>
+              <a:buFont typeface="Wingdings" panose="05000000000000000000" charset="0"/>
+              <a:buChar char="Ø"/>
             </a:pPr>
             <a:r>
-              <a:rPr lang="en-GB" altLang="en-US"/>
-              <a:t>MDN Web Docs</a:t>
-            </a:r>
-            <a:endParaRPr lang="en-GB" altLang="en-US"/>
-          </a:p>
-          <a:p>
-            <a:pPr lvl="1" indent="0">
-              <a:buFont typeface="+mj-lt"/>
-              <a:buNone/>
+              <a:rPr lang="en-GB" altLang="en-US" sz="2000"/>
+              <a:t>A blog is a frequently updated online personal journal or diary. It is a place to express yourself to the world.</a:t>
+            </a:r>
+            <a:endParaRPr lang="en-GB" altLang="en-US" sz="2000"/>
+          </a:p>
+          <a:p>
+            <a:pPr marL="342900" indent="-342900">
+              <a:buFont typeface="Wingdings" panose="05000000000000000000" charset="0"/>
+              <a:buChar char="Ø"/>
             </a:pPr>
-            <a:r>
-              <a:rPr lang="en-GB" altLang="en-US"/>
-              <a:t>https://developer.mozilla.org/en-US/</a:t>
-            </a:r>
-            <a:endParaRPr lang="en-GB" altLang="en-US"/>
-          </a:p>
-          <a:p>
-            <a:pPr lvl="1" indent="0">
-              <a:buFont typeface="+mj-lt"/>
-              <a:buNone/>
+            <a:endParaRPr lang="en-GB" altLang="en-US" sz="2000"/>
+          </a:p>
+          <a:p>
+            <a:pPr marL="342900" indent="-342900">
+              <a:buFont typeface="Wingdings" panose="05000000000000000000" charset="0"/>
+              <a:buChar char="Ø"/>
             </a:pPr>
-            <a:endParaRPr lang="en-GB" altLang="en-US"/>
+            <a:r>
+              <a:rPr lang="en-GB" altLang="en-US" sz="2000"/>
+              <a:t>A place to share your thoughts and your passions. Really, it’s anything you want it to be.</a:t>
+            </a:r>
+            <a:endParaRPr lang="en-GB" altLang="en-US" sz="2000"/>
           </a:p>
           <a:p>
             <a:pPr marL="342900" indent="-342900">
-              <a:buFont typeface="+mj-lt"/>
-              <a:buAutoNum type="arabicPeriod"/>
+              <a:buFont typeface="Wingdings" panose="05000000000000000000" charset="0"/>
+              <a:buChar char="Ø"/>
             </a:pPr>
-            <a:r>
-              <a:rPr lang="en-GB" altLang="en-US"/>
-              <a:t>W3Schools Online Web Tutorials</a:t>
-            </a:r>
-            <a:endParaRPr lang="en-GB" altLang="en-US"/>
-          </a:p>
-          <a:p>
-            <a:pPr lvl="1" indent="0">
-              <a:buFont typeface="+mj-lt"/>
-              <a:buNone/>
+            <a:endParaRPr lang="en-GB" altLang="en-US" sz="2000"/>
+          </a:p>
+          <a:p>
+            <a:pPr marL="342900" indent="-342900">
+              <a:buFont typeface="Wingdings" panose="05000000000000000000" charset="0"/>
+              <a:buChar char="Ø"/>
             </a:pPr>
             <a:r>
-              <a:rPr lang="en-GB" altLang="en-US"/>
-              <a:t>https://www.w3schools.com/</a:t>
-            </a:r>
-            <a:endParaRPr lang="en-GB" altLang="en-US"/>
-          </a:p>
-          <a:p>
-            <a:pPr lvl="1" indent="0">
-              <a:buFont typeface="+mj-lt"/>
-              <a:buNone/>
-            </a:pPr>
-            <a:endParaRPr lang="en-GB" altLang="en-US"/>
-          </a:p>
-          <a:p>
-            <a:pPr marL="342900" indent="-342900">
-              <a:buFont typeface="+mj-lt"/>
-              <a:buAutoNum type="arabicPeriod"/>
-            </a:pPr>
-            <a:r>
-              <a:rPr lang="en-GB" altLang="en-US"/>
-              <a:t>The Complete 2022 Web Development</a:t>
-            </a:r>
-            <a:endParaRPr lang="en-GB" altLang="en-US"/>
-          </a:p>
-          <a:p>
-            <a:pPr lvl="1" indent="0">
-              <a:buFont typeface="+mj-lt"/>
-              <a:buNone/>
-            </a:pPr>
-            <a:r>
-              <a:rPr lang="en-GB" altLang="en-US"/>
-              <a:t>https://www.udemy.com/course/the-complete-web-development-bootcamp/</a:t>
-            </a:r>
-            <a:endParaRPr lang="en-GB" altLang="en-US"/>
-          </a:p>
-          <a:p>
-            <a:pPr lvl="1" indent="0">
-              <a:buFont typeface="+mj-lt"/>
-              <a:buNone/>
-            </a:pPr>
-            <a:endParaRPr lang="en-GB" altLang="en-US"/>
-          </a:p>
-          <a:p>
-            <a:pPr marL="342900" indent="-342900">
-              <a:buFont typeface="+mj-lt"/>
-              <a:buAutoNum type="arabicPeriod"/>
-            </a:pPr>
-            <a:r>
-              <a:rPr lang="en-GB" altLang="en-US"/>
-              <a:t>Burdman, Jessica, “Collaborative Web Development” Addison Wesley</a:t>
-            </a:r>
-            <a:endParaRPr lang="en-GB" altLang="en-US"/>
-          </a:p>
-          <a:p>
-            <a:pPr marL="342900" indent="-342900">
-              <a:buFont typeface="+mj-lt"/>
-              <a:buAutoNum type="arabicPeriod"/>
-            </a:pPr>
-            <a:endParaRPr lang="en-GB" altLang="en-US"/>
-          </a:p>
-          <a:p>
-            <a:pPr marL="342900" indent="-342900">
-              <a:buFont typeface="+mj-lt"/>
-              <a:buAutoNum type="arabicPeriod"/>
-            </a:pPr>
-            <a:r>
-              <a:rPr lang="en-GB" altLang="en-US"/>
-              <a:t>Xavier, C, “ Web Technology and Design” , New Age International</a:t>
-            </a:r>
-            <a:endParaRPr lang="en-GB" altLang="en-US"/>
-          </a:p>
-        </p:txBody>
-      </p:sp>
-      <p:sp>
-        <p:nvSpPr>
-          <p:cNvPr id="4" name="Text Box 3"/>
-          <p:cNvSpPr txBox="1"/>
-          <p:nvPr/>
-        </p:nvSpPr>
-        <p:spPr>
-          <a:xfrm>
-            <a:off x="788035" y="5120640"/>
-            <a:ext cx="7592695" cy="645160"/>
-          </a:xfrm>
-          <a:prstGeom prst="rect">
-            <a:avLst/>
-          </a:prstGeom>
-          <a:noFill/>
-        </p:spPr>
-        <p:txBody>
-          <a:bodyPr wrap="square" rtlCol="0">
-            <a:spAutoFit/>
-            <a:scene3d>
-              <a:camera prst="orthographicFront"/>
-              <a:lightRig rig="threePt" dir="t"/>
-            </a:scene3d>
-          </a:bodyPr>
-          <a:p>
-            <a:r>
-              <a:rPr lang="en-GB" altLang="en-US" sz="3600">
-                <a:ln/>
-                <a:solidFill>
-                  <a:schemeClr val="accent1"/>
-                </a:solidFill>
-                <a:effectLst>
-                  <a:outerShdw blurRad="38100" dist="25400" dir="5400000" algn="ctr" rotWithShape="0">
-                    <a:srgbClr val="6E747A">
-                      <a:alpha val="43000"/>
-                    </a:srgbClr>
-                  </a:outerShdw>
-                </a:effectLst>
-              </a:rPr>
-              <a:t>Github Link</a:t>
-            </a:r>
-            <a:endParaRPr lang="en-GB" altLang="en-US" sz="3600">
-              <a:ln/>
-              <a:solidFill>
-                <a:schemeClr val="accent1"/>
-              </a:solidFill>
-              <a:effectLst>
-                <a:outerShdw blurRad="38100" dist="25400" dir="5400000" algn="ctr" rotWithShape="0">
-                  <a:srgbClr val="6E747A">
-                    <a:alpha val="43000"/>
-                  </a:srgbClr>
-                </a:outerShdw>
-              </a:effectLst>
-            </a:endParaRPr>
-          </a:p>
-        </p:txBody>
-      </p:sp>
-      <p:sp>
-        <p:nvSpPr>
-          <p:cNvPr id="5" name="Text Box 4"/>
-          <p:cNvSpPr txBox="1"/>
-          <p:nvPr/>
-        </p:nvSpPr>
-        <p:spPr>
-          <a:xfrm>
-            <a:off x="833120" y="5877560"/>
-            <a:ext cx="7848600" cy="368300"/>
-          </a:xfrm>
-          <a:prstGeom prst="rect">
-            <a:avLst/>
-          </a:prstGeom>
-          <a:noFill/>
-        </p:spPr>
-        <p:txBody>
-          <a:bodyPr wrap="square" rtlCol="0">
-            <a:spAutoFit/>
-          </a:bodyPr>
-          <a:p>
-            <a:r>
-              <a:rPr lang="en-GB" altLang="en-US"/>
-              <a:t>https://github.com/Akashdeep-Soni/blog-website-with-database</a:t>
-            </a:r>
-            <a:endParaRPr lang="en-GB" altLang="en-US"/>
+              <a:rPr lang="en-GB" altLang="en-US" sz="2000"/>
+              <a:t>For our purposes we’ll say that a blog is your own website that you are going to update on an ongoing basis.</a:t>
+            </a:r>
+            <a:endParaRPr lang="en-GB" altLang="en-US" sz="2000"/>
           </a:p>
         </p:txBody>
       </p:sp>
@@ -5635,7 +5992,319 @@
         <p:cNvGrpSpPr/>
         <p:nvPr/>
       </p:nvGrpSpPr>
-      <p:grpSpPr/>
+      <p:grpSpPr>
+        <a:xfrm>
+          <a:off x="0" y="0"/>
+          <a:ext cx="0" cy="0"/>
+          <a:chOff x="0" y="0"/>
+          <a:chExt cx="0" cy="0"/>
+        </a:xfrm>
+      </p:grpSpPr>
+      <p:sp>
+        <p:nvSpPr>
+          <p:cNvPr id="2" name="Title 1"/>
+          <p:cNvSpPr>
+            <a:spLocks noGrp="1"/>
+          </p:cNvSpPr>
+          <p:nvPr>
+            <p:ph type="title"/>
+          </p:nvPr>
+        </p:nvSpPr>
+        <p:spPr>
+          <a:xfrm>
+            <a:off x="609600" y="457200"/>
+            <a:ext cx="10972800" cy="582613"/>
+          </a:xfrm>
+        </p:spPr>
+        <p:txBody>
+          <a:bodyPr>
+            <a:scene3d>
+              <a:camera prst="orthographicFront"/>
+              <a:lightRig rig="threePt" dir="t"/>
+            </a:scene3d>
+          </a:bodyPr>
+          <a:lstStyle/>
+          <a:p>
+            <a:r>
+              <a:rPr lang="en-GB" altLang="en-US">
+                <a:solidFill>
+                  <a:schemeClr val="accent1"/>
+                </a:solidFill>
+                <a:effectLst>
+                  <a:outerShdw blurRad="38100" dist="25400" dir="5400000" algn="ctr" rotWithShape="0">
+                    <a:srgbClr val="6E747A">
+                      <a:alpha val="43000"/>
+                    </a:srgbClr>
+                  </a:outerShdw>
+                </a:effectLst>
+              </a:rPr>
+              <a:t>References</a:t>
+            </a:r>
+            <a:endParaRPr lang="en-GB" altLang="en-US">
+              <a:solidFill>
+                <a:schemeClr val="accent1"/>
+              </a:solidFill>
+              <a:effectLst>
+                <a:outerShdw blurRad="38100" dist="25400" dir="5400000" algn="ctr" rotWithShape="0">
+                  <a:srgbClr val="6E747A">
+                    <a:alpha val="43000"/>
+                  </a:srgbClr>
+                </a:outerShdw>
+              </a:effectLst>
+            </a:endParaRPr>
+          </a:p>
+        </p:txBody>
+      </p:sp>
+      <p:sp>
+        <p:nvSpPr>
+          <p:cNvPr id="3" name="Text Box 2"/>
+          <p:cNvSpPr txBox="1"/>
+          <p:nvPr/>
+        </p:nvSpPr>
+        <p:spPr>
+          <a:xfrm>
+            <a:off x="788035" y="1146175"/>
+            <a:ext cx="7893685" cy="3692525"/>
+          </a:xfrm>
+          <a:prstGeom prst="rect">
+            <a:avLst/>
+          </a:prstGeom>
+          <a:noFill/>
+        </p:spPr>
+        <p:txBody>
+          <a:bodyPr wrap="square" rtlCol="0">
+            <a:spAutoFit/>
+          </a:bodyPr>
+          <a:lstStyle/>
+          <a:p>
+            <a:pPr marL="342900" indent="-342900">
+              <a:buFont typeface="+mj-lt"/>
+              <a:buAutoNum type="arabicPeriod"/>
+            </a:pPr>
+            <a:r>
+              <a:rPr lang="en-GB" altLang="en-US"/>
+              <a:t>MDN Web Docs</a:t>
+            </a:r>
+            <a:endParaRPr lang="en-GB" altLang="en-US"/>
+          </a:p>
+          <a:p>
+            <a:pPr lvl="1" indent="0">
+              <a:buFont typeface="+mj-lt"/>
+              <a:buNone/>
+            </a:pPr>
+            <a:r>
+              <a:rPr lang="en-GB" altLang="en-US"/>
+              <a:t>https://developer.mozilla.org/en-US/</a:t>
+            </a:r>
+            <a:endParaRPr lang="en-GB" altLang="en-US"/>
+          </a:p>
+          <a:p>
+            <a:pPr lvl="1" indent="0">
+              <a:buFont typeface="+mj-lt"/>
+              <a:buNone/>
+            </a:pPr>
+            <a:endParaRPr lang="en-GB" altLang="en-US"/>
+          </a:p>
+          <a:p>
+            <a:pPr marL="342900" indent="-342900">
+              <a:buFont typeface="+mj-lt"/>
+              <a:buAutoNum type="arabicPeriod"/>
+            </a:pPr>
+            <a:r>
+              <a:rPr lang="en-GB" altLang="en-US"/>
+              <a:t>W3Schools Online Web Tutorials</a:t>
+            </a:r>
+            <a:endParaRPr lang="en-GB" altLang="en-US"/>
+          </a:p>
+          <a:p>
+            <a:pPr lvl="1" indent="0">
+              <a:buFont typeface="+mj-lt"/>
+              <a:buNone/>
+            </a:pPr>
+            <a:r>
+              <a:rPr lang="en-GB" altLang="en-US"/>
+              <a:t>https://www.w3schools.com/</a:t>
+            </a:r>
+            <a:endParaRPr lang="en-GB" altLang="en-US"/>
+          </a:p>
+          <a:p>
+            <a:pPr lvl="1" indent="0">
+              <a:buFont typeface="+mj-lt"/>
+              <a:buNone/>
+            </a:pPr>
+            <a:endParaRPr lang="en-GB" altLang="en-US"/>
+          </a:p>
+          <a:p>
+            <a:pPr marL="342900" indent="-342900">
+              <a:buFont typeface="+mj-lt"/>
+              <a:buAutoNum type="arabicPeriod"/>
+            </a:pPr>
+            <a:r>
+              <a:rPr lang="en-GB" altLang="en-US"/>
+              <a:t>The Complete 2022 Web Development</a:t>
+            </a:r>
+            <a:endParaRPr lang="en-GB" altLang="en-US"/>
+          </a:p>
+          <a:p>
+            <a:pPr lvl="1" indent="0">
+              <a:buFont typeface="+mj-lt"/>
+              <a:buNone/>
+            </a:pPr>
+            <a:r>
+              <a:rPr lang="en-GB" altLang="en-US"/>
+              <a:t>https://www.udemy.com/course/the-complete-web-development-bootcamp/</a:t>
+            </a:r>
+            <a:endParaRPr lang="en-GB" altLang="en-US"/>
+          </a:p>
+          <a:p>
+            <a:pPr lvl="1" indent="0">
+              <a:buFont typeface="+mj-lt"/>
+              <a:buNone/>
+            </a:pPr>
+            <a:endParaRPr lang="en-GB" altLang="en-US"/>
+          </a:p>
+          <a:p>
+            <a:pPr marL="342900" indent="-342900">
+              <a:buFont typeface="+mj-lt"/>
+              <a:buAutoNum type="arabicPeriod"/>
+            </a:pPr>
+            <a:r>
+              <a:rPr lang="en-GB" altLang="en-US"/>
+              <a:t>Burdman, Jessica, “Collaborative Web Development” Addison Wesley</a:t>
+            </a:r>
+            <a:endParaRPr lang="en-GB" altLang="en-US"/>
+          </a:p>
+          <a:p>
+            <a:pPr marL="342900" indent="-342900">
+              <a:buFont typeface="+mj-lt"/>
+              <a:buAutoNum type="arabicPeriod"/>
+            </a:pPr>
+            <a:endParaRPr lang="en-GB" altLang="en-US"/>
+          </a:p>
+          <a:p>
+            <a:pPr marL="342900" indent="-342900">
+              <a:buFont typeface="+mj-lt"/>
+              <a:buAutoNum type="arabicPeriod"/>
+            </a:pPr>
+            <a:r>
+              <a:rPr lang="en-GB" altLang="en-US"/>
+              <a:t>Xavier, C, “ Web Technology and Design” , New Age International</a:t>
+            </a:r>
+            <a:endParaRPr lang="en-GB" altLang="en-US"/>
+          </a:p>
+        </p:txBody>
+      </p:sp>
+      <p:sp>
+        <p:nvSpPr>
+          <p:cNvPr id="4" name="Text Box 3"/>
+          <p:cNvSpPr txBox="1"/>
+          <p:nvPr/>
+        </p:nvSpPr>
+        <p:spPr>
+          <a:xfrm>
+            <a:off x="788035" y="5120640"/>
+            <a:ext cx="7592695" cy="645160"/>
+          </a:xfrm>
+          <a:prstGeom prst="rect">
+            <a:avLst/>
+          </a:prstGeom>
+          <a:noFill/>
+        </p:spPr>
+        <p:txBody>
+          <a:bodyPr wrap="square" rtlCol="0">
+            <a:spAutoFit/>
+            <a:scene3d>
+              <a:camera prst="orthographicFront"/>
+              <a:lightRig rig="threePt" dir="t"/>
+            </a:scene3d>
+          </a:bodyPr>
+          <a:lstStyle/>
+          <a:p>
+            <a:r>
+              <a:rPr lang="en-GB" altLang="en-US" sz="3600">
+                <a:solidFill>
+                  <a:schemeClr val="accent1"/>
+                </a:solidFill>
+                <a:effectLst>
+                  <a:outerShdw blurRad="38100" dist="25400" dir="5400000" algn="ctr" rotWithShape="0">
+                    <a:srgbClr val="6E747A">
+                      <a:alpha val="43000"/>
+                    </a:srgbClr>
+                  </a:outerShdw>
+                </a:effectLst>
+              </a:rPr>
+              <a:t>Github Link</a:t>
+            </a:r>
+            <a:endParaRPr lang="en-GB" altLang="en-US" sz="3600">
+              <a:solidFill>
+                <a:schemeClr val="accent1"/>
+              </a:solidFill>
+              <a:effectLst>
+                <a:outerShdw blurRad="38100" dist="25400" dir="5400000" algn="ctr" rotWithShape="0">
+                  <a:srgbClr val="6E747A">
+                    <a:alpha val="43000"/>
+                  </a:srgbClr>
+                </a:outerShdw>
+              </a:effectLst>
+            </a:endParaRPr>
+          </a:p>
+        </p:txBody>
+      </p:sp>
+      <p:sp>
+        <p:nvSpPr>
+          <p:cNvPr id="5" name="Text Box 4"/>
+          <p:cNvSpPr txBox="1"/>
+          <p:nvPr/>
+        </p:nvSpPr>
+        <p:spPr>
+          <a:xfrm>
+            <a:off x="833120" y="5877560"/>
+            <a:ext cx="7848600" cy="368300"/>
+          </a:xfrm>
+          <a:prstGeom prst="rect">
+            <a:avLst/>
+          </a:prstGeom>
+          <a:noFill/>
+        </p:spPr>
+        <p:txBody>
+          <a:bodyPr wrap="square" rtlCol="0">
+            <a:spAutoFit/>
+          </a:bodyPr>
+          <a:lstStyle/>
+          <a:p>
+            <a:r>
+              <a:rPr lang="en-GB" altLang="en-US"/>
+              <a:t>https://github.com/Akashdeep-Soni/blog-website-with-database</a:t>
+            </a:r>
+            <a:endParaRPr lang="en-GB" altLang="en-US"/>
+          </a:p>
+        </p:txBody>
+      </p:sp>
+    </p:spTree>
+  </p:cSld>
+  <p:clrMapOvr>
+    <a:masterClrMapping/>
+  </p:clrMapOvr>
+</p:sld>
+</file>
+
+<file path=ppt/slides/slide18.xml><?xml version="1.0" encoding="utf-8"?>
+<p:sld xmlns:a="http://schemas.openxmlformats.org/drawingml/2006/main" xmlns:r="http://schemas.openxmlformats.org/officeDocument/2006/relationships" xmlns:p="http://schemas.openxmlformats.org/presentationml/2006/main">
+  <p:cSld>
+    <p:spTree>
+      <p:nvGrpSpPr>
+        <p:cNvPr id="1" name=""/>
+        <p:cNvGrpSpPr/>
+        <p:nvPr/>
+      </p:nvGrpSpPr>
+      <p:grpSpPr>
+        <a:xfrm>
+          <a:off x="0" y="0"/>
+          <a:ext cx="0" cy="0"/>
+          <a:chOff x="0" y="0"/>
+          <a:chExt cx="0" cy="0"/>
+        </a:xfrm>
+      </p:grpSpPr>
       <p:sp>
         <p:nvSpPr>
           <p:cNvPr id="3" name="Text Box 2"/>
@@ -5660,10 +6329,10 @@
               <a:lightRig rig="threePt" dir="t"/>
             </a:scene3d>
           </a:bodyPr>
+          <a:lstStyle/>
           <a:p>
             <a:r>
               <a:rPr lang="en-GB" altLang="en-US" sz="6000">
-                <a:ln/>
                 <a:solidFill>
                   <a:schemeClr val="accent1"/>
                 </a:solidFill>
@@ -5678,7 +6347,6 @@
               <a:t>Thank You</a:t>
             </a:r>
             <a:endParaRPr lang="en-GB" altLang="en-US" sz="6000">
-              <a:ln/>
               <a:solidFill>
                 <a:schemeClr val="accent1"/>
               </a:solidFill>
@@ -5710,7 +6378,14 @@
         <p:cNvGrpSpPr/>
         <p:nvPr/>
       </p:nvGrpSpPr>
-      <p:grpSpPr/>
+      <p:grpSpPr>
+        <a:xfrm>
+          <a:off x="0" y="0"/>
+          <a:ext cx="0" cy="0"/>
+          <a:chOff x="0" y="0"/>
+          <a:chExt cx="0" cy="0"/>
+        </a:xfrm>
+      </p:grpSpPr>
       <p:pic>
         <p:nvPicPr>
           <p:cNvPr id="100" name="Picture 99"/>
@@ -5757,6 +6432,7 @@
           <a:bodyPr wrap="square" rtlCol="0">
             <a:spAutoFit/>
           </a:bodyPr>
+          <a:lstStyle/>
           <a:p>
             <a:pPr algn="ctr"/>
             <a:r>
@@ -5792,7 +6468,14 @@
         <p:cNvGrpSpPr/>
         <p:nvPr/>
       </p:nvGrpSpPr>
-      <p:grpSpPr/>
+      <p:grpSpPr>
+        <a:xfrm>
+          <a:off x="0" y="0"/>
+          <a:ext cx="0" cy="0"/>
+          <a:chOff x="0" y="0"/>
+          <a:chExt cx="0" cy="0"/>
+        </a:xfrm>
+      </p:grpSpPr>
       <p:sp>
         <p:nvSpPr>
           <p:cNvPr id="2" name="Text Box 1"/>
@@ -5802,7 +6485,7 @@
         <p:spPr>
           <a:xfrm>
             <a:off x="1745615" y="1190625"/>
-            <a:ext cx="6468110" cy="4707890"/>
+            <a:ext cx="6468110" cy="5077460"/>
           </a:xfrm>
           <a:prstGeom prst="rect">
             <a:avLst/>
@@ -5813,10 +6496,10 @@
           <a:bodyPr wrap="square" rtlCol="0">
             <a:spAutoFit/>
           </a:bodyPr>
+          <a:lstStyle/>
           <a:p>
             <a:r>
               <a:rPr lang="en-GB" altLang="en-US" sz="3200">
-                <a:ln/>
                 <a:solidFill>
                   <a:schemeClr val="accent1"/>
                 </a:solidFill>
@@ -5832,7 +6515,6 @@
               <a:t>Table of Contents</a:t>
             </a:r>
             <a:endParaRPr lang="en-GB" altLang="en-US" sz="3200">
-              <a:ln/>
               <a:solidFill>
                 <a:schemeClr val="accent1"/>
               </a:solidFill>
@@ -5908,10 +6590,77 @@
                 <a:cs typeface="+mn-lt"/>
                 <a:sym typeface="+mn-ea"/>
               </a:rPr>
-              <a:t>Hardware and Software Used	</a:t>
+              <a:t>Hardware and Software Used</a:t>
             </a:r>
             <a:endParaRPr lang="en-US" sz="2400" dirty="0">
               <a:cs typeface="+mn-lt"/>
+              <a:sym typeface="+mn-ea"/>
+            </a:endParaRPr>
+          </a:p>
+          <a:p>
+            <a:pPr marL="342900" indent="-342900">
+              <a:buFont typeface="Wingdings" panose="05000000000000000000" charset="0"/>
+              <a:buChar char="Ø"/>
+            </a:pPr>
+            <a:r>
+              <a:rPr lang="en-GB" altLang="en-US" sz="2400" dirty="0">
+                <a:cs typeface="+mn-lt"/>
+                <a:sym typeface="+mn-ea"/>
+              </a:rPr>
+              <a:t>Feasibility Study</a:t>
+            </a:r>
+            <a:endParaRPr lang="en-US" sz="2400" dirty="0">
+              <a:cs typeface="+mn-lt"/>
+            </a:endParaRPr>
+          </a:p>
+          <a:p>
+            <a:pPr marL="342900" indent="-342900">
+              <a:buFont typeface="Wingdings" panose="05000000000000000000" charset="0"/>
+              <a:buChar char="Ø"/>
+            </a:pPr>
+            <a:r>
+              <a:rPr lang="en-US" sz="2400" dirty="0">
+                <a:cs typeface="+mn-lt"/>
+                <a:sym typeface="+mn-ea"/>
+              </a:rPr>
+              <a:t>Project</a:t>
+            </a:r>
+            <a:endParaRPr lang="en-US" sz="2400" dirty="0">
+              <a:cs typeface="+mn-lt"/>
+              <a:sym typeface="+mn-ea"/>
+            </a:endParaRPr>
+          </a:p>
+          <a:p>
+            <a:pPr marL="342900" indent="-342900">
+              <a:buFont typeface="Wingdings" panose="05000000000000000000" charset="0"/>
+              <a:buChar char="Ø"/>
+            </a:pPr>
+            <a:r>
+              <a:rPr lang="en-GB" altLang="en-US" sz="2400" dirty="0">
+                <a:cs typeface="+mn-lt"/>
+                <a:sym typeface="+mn-ea"/>
+              </a:rPr>
+              <a:t>Snapshots</a:t>
+            </a:r>
+            <a:endParaRPr lang="en-US" sz="2400" dirty="0">
+              <a:cs typeface="+mn-lt"/>
+            </a:endParaRPr>
+          </a:p>
+          <a:p>
+            <a:pPr marL="342900" indent="-342900">
+              <a:buFont typeface="Wingdings" panose="05000000000000000000" charset="0"/>
+              <a:buChar char="Ø"/>
+            </a:pPr>
+            <a:r>
+              <a:rPr lang="en-US" sz="2400" dirty="0">
+                <a:cs typeface="+mn-lt"/>
+                <a:sym typeface="+mn-ea"/>
+              </a:rPr>
+              <a:t>Flow Chart</a:t>
+            </a:r>
+            <a:endParaRPr lang="en-US" sz="2400" dirty="0">
+              <a:cs typeface="+mn-lt"/>
+              <a:sym typeface="+mn-ea"/>
             </a:endParaRPr>
           </a:p>
           <a:p>
@@ -5925,55 +6674,6 @@
                 <a:sym typeface="+mn-ea"/>
               </a:rPr>
               <a:t>Benefits</a:t>
-            </a:r>
-            <a:endParaRPr lang="en-US" sz="2400" dirty="0">
-              <a:cs typeface="+mn-lt"/>
-            </a:endParaRPr>
-          </a:p>
-          <a:p>
-            <a:pPr marL="342900" indent="-342900">
-              <a:buFont typeface="Wingdings" panose="05000000000000000000" charset="0"/>
-              <a:buChar char="Ø"/>
-            </a:pPr>
-            <a:r>
-              <a:rPr lang="en-US" sz="2400" dirty="0">
-                <a:cs typeface="+mn-lt"/>
-                <a:sym typeface="+mn-ea"/>
-              </a:rPr>
-              <a:t>Project</a:t>
-            </a:r>
-            <a:endParaRPr lang="en-US" sz="2400" dirty="0">
-              <a:cs typeface="+mn-lt"/>
-              <a:sym typeface="+mn-ea"/>
-            </a:endParaRPr>
-          </a:p>
-          <a:p>
-            <a:pPr marL="342900" indent="-342900">
-              <a:buFont typeface="Wingdings" panose="05000000000000000000" charset="0"/>
-              <a:buChar char="Ø"/>
-            </a:pPr>
-            <a:r>
-              <a:rPr lang="en-GB" altLang="en-US" sz="2400" dirty="0">
-                <a:cs typeface="+mn-lt"/>
-                <a:sym typeface="+mn-ea"/>
-              </a:rPr>
-              <a:t>Snapshots</a:t>
-            </a:r>
-            <a:endParaRPr lang="en-US" sz="2400" dirty="0">
-              <a:cs typeface="+mn-lt"/>
-            </a:endParaRPr>
-          </a:p>
-          <a:p>
-            <a:pPr marL="342900" indent="-342900">
-              <a:buFont typeface="Wingdings" panose="05000000000000000000" charset="0"/>
-              <a:buChar char="Ø"/>
-            </a:pPr>
-            <a:r>
-              <a:rPr lang="en-US" sz="2400" dirty="0">
-                <a:cs typeface="+mn-lt"/>
-                <a:sym typeface="+mn-ea"/>
-              </a:rPr>
-              <a:t>Flow Chart</a:t>
             </a:r>
             <a:endParaRPr lang="en-US" sz="2400" dirty="0">
               <a:cs typeface="+mn-lt"/>
@@ -6062,7 +6762,14 @@
         <p:cNvGrpSpPr/>
         <p:nvPr/>
       </p:nvGrpSpPr>
-      <p:grpSpPr/>
+      <p:grpSpPr>
+        <a:xfrm>
+          <a:off x="0" y="0"/>
+          <a:ext cx="0" cy="0"/>
+          <a:chOff x="0" y="0"/>
+          <a:chExt cx="0" cy="0"/>
+        </a:xfrm>
+      </p:grpSpPr>
       <p:sp>
         <p:nvSpPr>
           <p:cNvPr id="2" name="Title 1"/>
@@ -6086,10 +6793,10 @@
               <a:lightRig rig="threePt" dir="t"/>
             </a:scene3d>
           </a:bodyPr>
+          <a:lstStyle/>
           <a:p>
             <a:r>
               <a:rPr lang="en-GB" altLang="en-US">
-                <a:ln/>
                 <a:solidFill>
                   <a:schemeClr val="accent1"/>
                 </a:solidFill>
@@ -6104,7 +6811,6 @@
               <a:t>Introduction</a:t>
             </a:r>
             <a:endParaRPr lang="en-GB" altLang="en-US">
-              <a:ln/>
               <a:solidFill>
                 <a:schemeClr val="accent1"/>
               </a:solidFill>
@@ -6139,6 +6845,7 @@
           <a:bodyPr wrap="square" rtlCol="0">
             <a:spAutoFit/>
           </a:bodyPr>
+          <a:lstStyle/>
           <a:p>
             <a:pPr marL="342900" indent="-342900">
               <a:buFont typeface="Wingdings" panose="05000000000000000000" charset="0"/>
@@ -6232,7 +6939,14 @@
         <p:cNvGrpSpPr/>
         <p:nvPr/>
       </p:nvGrpSpPr>
-      <p:grpSpPr/>
+      <p:grpSpPr>
+        <a:xfrm>
+          <a:off x="0" y="0"/>
+          <a:ext cx="0" cy="0"/>
+          <a:chOff x="0" y="0"/>
+          <a:chExt cx="0" cy="0"/>
+        </a:xfrm>
+      </p:grpSpPr>
       <p:sp>
         <p:nvSpPr>
           <p:cNvPr id="2" name="Title 1"/>
@@ -6251,10 +6965,10 @@
         </p:spPr>
         <p:txBody>
           <a:bodyPr/>
+          <a:lstStyle/>
           <a:p>
             <a:r>
               <a:rPr lang="en-GB" altLang="en-US">
-                <a:ln/>
                 <a:solidFill>
                   <a:schemeClr val="accent1"/>
                 </a:solidFill>
@@ -6269,7 +6983,6 @@
               <a:t>Technology Used</a:t>
             </a:r>
             <a:endParaRPr lang="en-GB" altLang="en-US">
-              <a:ln/>
               <a:solidFill>
                 <a:schemeClr val="accent1"/>
               </a:solidFill>
@@ -6304,10 +7017,10 @@
           <a:bodyPr wrap="square" rtlCol="0">
             <a:spAutoFit/>
           </a:bodyPr>
+          <a:lstStyle/>
           <a:p>
             <a:r>
               <a:rPr lang="en-GB" altLang="en-US" sz="2400">
-                <a:ln/>
                 <a:solidFill>
                   <a:schemeClr val="tx1"/>
                 </a:solidFill>
@@ -6322,7 +7035,6 @@
               <a:t>Web Technology</a:t>
             </a:r>
             <a:endParaRPr lang="en-GB" altLang="en-US" sz="2400">
-              <a:ln/>
               <a:solidFill>
                 <a:schemeClr val="tx1"/>
               </a:solidFill>
@@ -6431,7 +7143,14 @@
         <p:cNvGrpSpPr/>
         <p:nvPr/>
       </p:nvGrpSpPr>
-      <p:grpSpPr/>
+      <p:grpSpPr>
+        <a:xfrm>
+          <a:off x="0" y="0"/>
+          <a:ext cx="0" cy="0"/>
+          <a:chOff x="0" y="0"/>
+          <a:chExt cx="0" cy="0"/>
+        </a:xfrm>
+      </p:grpSpPr>
       <p:sp>
         <p:nvSpPr>
           <p:cNvPr id="2" name="Title 1"/>
@@ -6450,6 +7169,7 @@
         </p:spPr>
         <p:txBody>
           <a:bodyPr/>
+          <a:lstStyle/>
           <a:p>
             <a:r>
               <a:rPr lang="en-GB" altLang="en-US">
@@ -6501,6 +7221,7 @@
           <a:bodyPr wrap="square" rtlCol="0">
             <a:spAutoFit/>
           </a:bodyPr>
+          <a:lstStyle/>
           <a:p>
             <a:pPr marL="342900" indent="-342900">
               <a:lnSpc>
@@ -6511,7 +7232,6 @@
             </a:pPr>
             <a:r>
               <a:rPr lang="en-GB" altLang="en-IN" sz="2000" dirty="0">
-                <a:ln/>
                 <a:solidFill>
                   <a:schemeClr val="tx1"/>
                 </a:solidFill>
@@ -6527,7 +7247,6 @@
               <a:t>Frontend</a:t>
             </a:r>
             <a:endParaRPr lang="en-GB" altLang="en-IN" sz="2000" dirty="0">
-              <a:ln/>
               <a:solidFill>
                 <a:schemeClr val="tx1"/>
               </a:solidFill>
@@ -6582,7 +7301,6 @@
             </a:pPr>
             <a:r>
               <a:rPr lang="en-GB" altLang="en-IN" sz="2000" dirty="0">
-                <a:ln/>
                 <a:solidFill>
                   <a:schemeClr val="tx1"/>
                 </a:solidFill>
@@ -6598,7 +7316,6 @@
               <a:t>Backend</a:t>
             </a:r>
             <a:endParaRPr lang="en-GB" altLang="en-IN" sz="2000" dirty="0">
-              <a:ln/>
               <a:solidFill>
                 <a:schemeClr val="tx1"/>
               </a:solidFill>
@@ -6653,7 +7370,6 @@
             </a:pPr>
             <a:r>
               <a:rPr lang="en-GB" altLang="en-IN" sz="2000" dirty="0">
-                <a:ln/>
                 <a:solidFill>
                   <a:schemeClr val="tx1"/>
                 </a:solidFill>
@@ -6669,7 +7385,6 @@
               <a:t>Database</a:t>
             </a:r>
             <a:endParaRPr lang="en-IN" sz="2000" dirty="0">
-              <a:ln/>
               <a:solidFill>
                 <a:schemeClr val="tx1"/>
               </a:solidFill>
@@ -6733,7 +7448,14 @@
         <p:cNvGrpSpPr/>
         <p:nvPr/>
       </p:nvGrpSpPr>
-      <p:grpSpPr/>
+      <p:grpSpPr>
+        <a:xfrm>
+          <a:off x="0" y="0"/>
+          <a:ext cx="0" cy="0"/>
+          <a:chOff x="0" y="0"/>
+          <a:chExt cx="0" cy="0"/>
+        </a:xfrm>
+      </p:grpSpPr>
       <p:sp>
         <p:nvSpPr>
           <p:cNvPr id="2" name="Title 1"/>
@@ -6752,10 +7474,10 @@
         </p:spPr>
         <p:txBody>
           <a:bodyPr/>
+          <a:lstStyle/>
           <a:p>
             <a:r>
               <a:rPr lang="en-US" dirty="0">
-                <a:ln/>
                 <a:solidFill>
                   <a:schemeClr val="accent1"/>
                 </a:solidFill>
@@ -6772,7 +7494,6 @@
               <a:t>Hardware and Software Used	</a:t>
             </a:r>
             <a:endParaRPr lang="en-US" altLang="en-US" dirty="0">
-              <a:ln/>
               <a:solidFill>
                 <a:schemeClr val="accent1"/>
               </a:solidFill>
@@ -6809,6 +7530,7 @@
           <a:bodyPr wrap="square" rtlCol="0">
             <a:spAutoFit/>
           </a:bodyPr>
+          <a:lstStyle/>
           <a:p>
             <a:pPr indent="0">
               <a:buFont typeface="Arial" panose="020B0604020202020204" pitchFamily="34" charset="0"/>
@@ -6816,7 +7538,6 @@
             </a:pPr>
             <a:r>
               <a:rPr lang="en-IN" sz="2400" dirty="0">
-                <a:ln/>
                 <a:solidFill>
                   <a:schemeClr val="tx1"/>
                 </a:solidFill>
@@ -6832,7 +7553,6 @@
               <a:t>Hardware used</a:t>
             </a:r>
             <a:endParaRPr lang="en-IN" sz="2400" dirty="0">
-              <a:ln/>
               <a:solidFill>
                 <a:schemeClr val="tx1"/>
               </a:solidFill>
@@ -6911,7 +7631,6 @@
             </a:pPr>
             <a:r>
               <a:rPr lang="en-IN" sz="2400" dirty="0">
-                <a:ln/>
                 <a:solidFill>
                   <a:schemeClr val="tx1"/>
                 </a:solidFill>
@@ -6927,7 +7646,6 @@
               <a:t>Software used</a:t>
             </a:r>
             <a:endParaRPr lang="en-IN" sz="2400" dirty="0">
-              <a:ln/>
               <a:solidFill>
                 <a:schemeClr val="tx1"/>
               </a:solidFill>
@@ -6959,13 +7677,7 @@
               <a:rPr lang="en-GB" altLang="en-IN" sz="2000" dirty="0">
                 <a:sym typeface="+mn-ea"/>
               </a:rPr>
-              <a:t>Editor: </a:t>
-            </a:r>
-            <a:r>
-              <a:rPr lang="en-GB" altLang="en-IN" sz="2000" dirty="0">
-                <a:sym typeface="+mn-ea"/>
-              </a:rPr>
-              <a:t>Visual Studio Code</a:t>
+              <a:t>Editor: Visual Studio Code</a:t>
             </a:r>
             <a:endParaRPr lang="en-GB" altLang="en-IN" sz="2000" dirty="0"/>
           </a:p>
@@ -7017,7 +7729,14 @@
         <p:cNvGrpSpPr/>
         <p:nvPr/>
       </p:nvGrpSpPr>
-      <p:grpSpPr/>
+      <p:grpSpPr>
+        <a:xfrm>
+          <a:off x="0" y="0"/>
+          <a:ext cx="0" cy="0"/>
+          <a:chOff x="0" y="0"/>
+          <a:chExt cx="0" cy="0"/>
+        </a:xfrm>
+      </p:grpSpPr>
       <p:sp>
         <p:nvSpPr>
           <p:cNvPr id="2" name="Title 1"/>
@@ -7030,16 +7749,17 @@
         </p:nvSpPr>
         <p:spPr>
           <a:xfrm>
-            <a:off x="609600" y="379730"/>
+            <a:off x="609600" y="434340"/>
             <a:ext cx="10972800" cy="582613"/>
           </a:xfrm>
         </p:spPr>
         <p:txBody>
           <a:bodyPr/>
-          <a:p>
-            <a:r>
-              <a:rPr lang="en-GB" altLang="en-US">
-                <a:ln/>
+          <a:lstStyle/>
+          <a:p>
+            <a:r>
+              <a:rPr lang="en-US" dirty="0" smtClean="0">
+                <a:ln w="0"/>
                 <a:solidFill>
                   <a:schemeClr val="accent1"/>
                 </a:solidFill>
@@ -7051,10 +7771,10 @@
                   </a:outerShdw>
                 </a:effectLst>
               </a:rPr>
-              <a:t>Blog Website with Database</a:t>
-            </a:r>
-            <a:endParaRPr lang="en-GB" altLang="en-US">
-              <a:ln/>
+              <a:t>Feasibility Study</a:t>
+            </a:r>
+            <a:endParaRPr lang="en-US" dirty="0">
+              <a:ln w="0"/>
               <a:solidFill>
                 <a:schemeClr val="accent1"/>
               </a:solidFill>
@@ -7077,8 +7797,8 @@
         </p:nvSpPr>
         <p:spPr>
           <a:xfrm>
-            <a:off x="888365" y="1524635"/>
-            <a:ext cx="9641205" cy="3784600"/>
+            <a:off x="955040" y="1430383"/>
+            <a:ext cx="7447915" cy="4339650"/>
           </a:xfrm>
           <a:prstGeom prst="rect">
             <a:avLst/>
@@ -7089,10 +7809,50 @@
           <a:bodyPr wrap="square" rtlCol="0">
             <a:spAutoFit/>
           </a:bodyPr>
-          <a:p>
-            <a:r>
-              <a:rPr lang="en-GB" altLang="en-US" sz="2400">
-                <a:ln/>
+          <a:lstStyle/>
+          <a:p>
+            <a:r>
+              <a:rPr lang="en-GB" altLang="en-US" sz="2400" dirty="0" smtClean="0">
+                <a:effectLst>
+                  <a:outerShdw blurRad="38100" dist="19050" dir="2700000" algn="tl" rotWithShape="0">
+                    <a:schemeClr val="dk1">
+                      <a:alpha val="40000"/>
+                    </a:schemeClr>
+                  </a:outerShdw>
+                </a:effectLst>
+              </a:rPr>
+              <a:t>Technical Feasibility</a:t>
+            </a:r>
+            <a:endParaRPr lang="en-GB" altLang="en-US" sz="2400" dirty="0">
+              <a:solidFill>
+                <a:schemeClr val="tx1"/>
+              </a:solidFill>
+              <a:effectLst>
+                <a:outerShdw blurRad="38100" dist="19050" dir="2700000" algn="tl" rotWithShape="0">
+                  <a:schemeClr val="dk1">
+                    <a:alpha val="40000"/>
+                  </a:schemeClr>
+                </a:outerShdw>
+              </a:effectLst>
+            </a:endParaRPr>
+          </a:p>
+          <a:p>
+            <a:r>
+              <a:rPr lang="en-GB" altLang="en-US" sz="2400" dirty="0"/>
+              <a:t>	</a:t>
+            </a:r>
+            <a:r>
+              <a:rPr lang="en-GB" altLang="en-US" sz="2000" dirty="0" smtClean="0"/>
+              <a:t>All the library and tools are open source and free to 	use. So, the technical team are capable of converting       	the ideas into working system.</a:t>
+            </a:r>
+            <a:endParaRPr lang="en-GB" altLang="en-US" sz="2000" dirty="0"/>
+          </a:p>
+          <a:p>
+            <a:endParaRPr lang="en-GB" altLang="en-US" sz="2000" dirty="0"/>
+          </a:p>
+          <a:p>
+            <a:r>
+              <a:rPr lang="en-GB" altLang="en-US" sz="2400" dirty="0" smtClean="0">
                 <a:solidFill>
                   <a:schemeClr val="tx1"/>
                 </a:solidFill>
@@ -7104,10 +7864,9 @@
                   </a:outerShdw>
                 </a:effectLst>
               </a:rPr>
-              <a:t>Task</a:t>
-            </a:r>
-            <a:endParaRPr lang="en-GB" altLang="en-US" sz="2400">
-              <a:ln/>
+              <a:t>Economical Feasibility</a:t>
+            </a:r>
+            <a:endParaRPr lang="en-GB" altLang="en-US" sz="2400" dirty="0">
               <a:solidFill>
                 <a:schemeClr val="tx1"/>
               </a:solidFill>
@@ -7121,11 +7880,33 @@
             </a:endParaRPr>
           </a:p>
           <a:p>
-            <a:endParaRPr lang="en-GB" altLang="en-US" sz="2400">
-              <a:ln/>
-              <a:solidFill>
-                <a:schemeClr val="tx1"/>
-              </a:solidFill>
+            <a:r>
+              <a:rPr lang="en-GB" altLang="en-US" sz="2000" dirty="0"/>
+              <a:t>	</a:t>
+            </a:r>
+            <a:r>
+              <a:rPr lang="en-GB" altLang="en-US" sz="2000" dirty="0" smtClean="0"/>
+              <a:t>The viability, cost and benefits of the project are feasible 	because it does not require any extra hardware and all 	the resources are open source and free.</a:t>
+            </a:r>
+            <a:endParaRPr lang="en-GB" altLang="en-US" sz="2000" dirty="0" smtClean="0"/>
+          </a:p>
+          <a:p>
+            <a:endParaRPr lang="en-GB" altLang="en-US" sz="2000" dirty="0" smtClean="0"/>
+          </a:p>
+          <a:p>
+            <a:r>
+              <a:rPr lang="en-GB" altLang="en-US" sz="2400" dirty="0" smtClean="0">
+                <a:effectLst>
+                  <a:outerShdw blurRad="38100" dist="19050" dir="2700000" algn="tl" rotWithShape="0">
+                    <a:schemeClr val="dk1">
+                      <a:alpha val="40000"/>
+                    </a:schemeClr>
+                  </a:outerShdw>
+                </a:effectLst>
+              </a:rPr>
+              <a:t>Operational Feasibility</a:t>
+            </a:r>
+            <a:endParaRPr lang="en-GB" altLang="en-US" sz="2400" dirty="0" smtClean="0">
               <a:effectLst>
                 <a:outerShdw blurRad="38100" dist="19050" dir="2700000" algn="tl" rotWithShape="0">
                   <a:schemeClr val="dk1">
@@ -7136,114 +7917,27 @@
             </a:endParaRPr>
           </a:p>
           <a:p>
-            <a:pPr marL="342900" indent="-342900" algn="l">
-              <a:buFont typeface="Wingdings" panose="05000000000000000000" charset="0"/>
-              <a:buChar char="Ø"/>
-            </a:pPr>
-            <a:r>
-              <a:rPr lang="en-GB" altLang="en-IN" sz="2000" dirty="0">
-                <a:sym typeface="+mn-ea"/>
-              </a:rPr>
-              <a:t>To provide a website where anybody can compose a blog anonymously and anybody can read it.</a:t>
-            </a:r>
-            <a:endParaRPr lang="en-GB" altLang="en-IN" sz="2000" dirty="0">
-              <a:sym typeface="+mn-ea"/>
-            </a:endParaRPr>
-          </a:p>
-          <a:p>
-            <a:pPr marL="342900" indent="-342900" algn="l">
-              <a:buFont typeface="Wingdings" panose="05000000000000000000" charset="0"/>
-              <a:buChar char="Ø"/>
-            </a:pPr>
-            <a:endParaRPr lang="en-GB" altLang="en-IN" sz="2000" dirty="0"/>
-          </a:p>
-          <a:p>
-            <a:pPr marL="342900" indent="-342900" algn="l">
-              <a:buFont typeface="Wingdings" panose="05000000000000000000" charset="0"/>
-              <a:buChar char="Ø"/>
-            </a:pPr>
-            <a:r>
-              <a:rPr lang="en-GB" altLang="en-IN" sz="2000" dirty="0">
-                <a:sym typeface="+mn-ea"/>
-              </a:rPr>
-              <a:t>We will also provide the functionality to delete blogs.</a:t>
-            </a:r>
-            <a:endParaRPr lang="en-GB" altLang="en-IN" sz="2000" dirty="0"/>
-          </a:p>
-          <a:p>
-            <a:pPr marL="342900" indent="-342900"/>
-            <a:endParaRPr lang="en-GB" altLang="en-US" sz="2400">
-              <a:ln/>
-              <a:solidFill>
-                <a:schemeClr val="tx1"/>
-              </a:solidFill>
-              <a:effectLst>
-                <a:outerShdw blurRad="38100" dist="19050" dir="2700000" algn="tl" rotWithShape="0">
-                  <a:schemeClr val="dk1">
-                    <a:alpha val="40000"/>
-                  </a:schemeClr>
-                </a:outerShdw>
-              </a:effectLst>
-            </a:endParaRPr>
-          </a:p>
-          <a:p>
-            <a:pPr marL="342900" indent="-342900"/>
-            <a:r>
-              <a:rPr lang="en-GB" altLang="en-US" sz="2400">
-                <a:ln/>
-                <a:solidFill>
-                  <a:schemeClr val="tx1"/>
-                </a:solidFill>
-                <a:effectLst>
-                  <a:outerShdw blurRad="38100" dist="19050" dir="2700000" algn="tl" rotWithShape="0">
-                    <a:schemeClr val="dk1">
-                      <a:alpha val="40000"/>
-                    </a:schemeClr>
-                  </a:outerShdw>
-                </a:effectLst>
-              </a:rPr>
-              <a:t>Constraint</a:t>
-            </a:r>
-            <a:endParaRPr lang="en-GB" altLang="en-US" sz="2400">
-              <a:ln/>
-              <a:solidFill>
-                <a:schemeClr val="tx1"/>
-              </a:solidFill>
-              <a:effectLst>
-                <a:outerShdw blurRad="38100" dist="19050" dir="2700000" algn="tl" rotWithShape="0">
-                  <a:schemeClr val="dk1">
-                    <a:alpha val="40000"/>
-                  </a:schemeClr>
-                </a:outerShdw>
-              </a:effectLst>
-            </a:endParaRPr>
-          </a:p>
-          <a:p>
-            <a:pPr marL="342900" indent="-342900"/>
-            <a:endParaRPr lang="en-GB" altLang="en-US" sz="2400">
-              <a:ln/>
-              <a:solidFill>
-                <a:schemeClr val="tx1"/>
-              </a:solidFill>
-              <a:effectLst>
-                <a:outerShdw blurRad="38100" dist="19050" dir="2700000" algn="tl" rotWithShape="0">
-                  <a:schemeClr val="dk1">
-                    <a:alpha val="40000"/>
-                  </a:schemeClr>
-                </a:outerShdw>
-              </a:effectLst>
-            </a:endParaRPr>
-          </a:p>
-          <a:p>
-            <a:pPr marL="342900" indent="-342900">
-              <a:buFont typeface="Wingdings" panose="05000000000000000000" charset="0"/>
-              <a:buChar char="Ø"/>
-            </a:pPr>
-            <a:r>
-              <a:rPr lang="en-GB" altLang="en-US" sz="2000"/>
-              <a:t> There is no account registration hence the blog is public and anybody can read      or delete blog.</a:t>
-            </a:r>
-            <a:endParaRPr lang="en-GB" altLang="en-US" sz="2000"/>
+            <a:r>
+              <a:rPr lang="en-GB" altLang="en-US" sz="2000" dirty="0"/>
+              <a:t>	</a:t>
+            </a:r>
+            <a:r>
+              <a:rPr lang="en-GB" altLang="en-US" sz="2000" dirty="0" smtClean="0"/>
+              <a:t>This project met all the organizational needs and </a:t>
+            </a:r>
+            <a:r>
+              <a:rPr lang="en-GB" altLang="en-US" sz="2000" dirty="0" smtClean="0"/>
+              <a:t>can be 	easily used to read, delete and compose </a:t>
+            </a:r>
+            <a:r>
+              <a:rPr lang="en-GB" altLang="en-US" sz="2000" smtClean="0"/>
+              <a:t>post effi</a:t>
+            </a:r>
+            <a:r>
+              <a:rPr lang="en-GB" altLang="en-US" sz="2000" smtClean="0"/>
+              <a:t>ciently. </a:t>
+            </a:r>
+            <a:endParaRPr lang="en-GB" altLang="en-US" sz="2000" dirty="0"/>
           </a:p>
         </p:txBody>
       </p:sp>
@@ -7264,10 +7958,17 @@
         <p:cNvGrpSpPr/>
         <p:nvPr/>
       </p:nvGrpSpPr>
-      <p:grpSpPr/>
-      <p:sp>
-        <p:nvSpPr>
-          <p:cNvPr id="6" name="Title 5"/>
+      <p:grpSpPr>
+        <a:xfrm>
+          <a:off x="0" y="0"/>
+          <a:ext cx="0" cy="0"/>
+          <a:chOff x="0" y="0"/>
+          <a:chExt cx="0" cy="0"/>
+        </a:xfrm>
+      </p:grpSpPr>
+      <p:sp>
+        <p:nvSpPr>
+          <p:cNvPr id="2" name="Title 1"/>
           <p:cNvSpPr>
             <a:spLocks noGrp="1"/>
           </p:cNvSpPr>
@@ -7275,18 +7976,18 @@
             <p:ph type="title"/>
           </p:nvPr>
         </p:nvSpPr>
-        <p:spPr/>
-        <p:txBody>
-          <a:bodyPr>
-            <a:scene3d>
-              <a:camera prst="orthographicFront"/>
-              <a:lightRig rig="threePt" dir="t"/>
-            </a:scene3d>
-          </a:bodyPr>
+        <p:spPr>
+          <a:xfrm>
+            <a:off x="609600" y="379730"/>
+            <a:ext cx="10972800" cy="582613"/>
+          </a:xfrm>
+        </p:spPr>
+        <p:txBody>
+          <a:bodyPr/>
+          <a:lstStyle/>
           <a:p>
             <a:r>
               <a:rPr lang="en-GB" altLang="en-US">
-                <a:ln/>
                 <a:solidFill>
                   <a:schemeClr val="accent1"/>
                 </a:solidFill>
@@ -7298,10 +7999,9 @@
                   </a:outerShdw>
                 </a:effectLst>
               </a:rPr>
-              <a:t>Snapshots</a:t>
+              <a:t>Blog Website with Database</a:t>
             </a:r>
             <a:endParaRPr lang="en-GB" altLang="en-US">
-              <a:ln/>
               <a:solidFill>
                 <a:schemeClr val="accent1"/>
               </a:solidFill>
@@ -7316,32 +8016,186 @@
           </a:p>
         </p:txBody>
       </p:sp>
-      <p:pic>
-        <p:nvPicPr>
-          <p:cNvPr id="9" name="Content Placeholder 8"/>
-          <p:cNvPicPr>
-            <a:picLocks noChangeAspect="1"/>
-          </p:cNvPicPr>
-          <p:nvPr>
-            <p:ph idx="1"/>
-          </p:nvPr>
-        </p:nvPicPr>
-        <p:blipFill>
-          <a:blip r:embed="rId1"/>
-          <a:stretch>
-            <a:fillRect/>
-          </a:stretch>
-        </p:blipFill>
+      <p:sp>
+        <p:nvSpPr>
+          <p:cNvPr id="3" name="Text Box 2"/>
+          <p:cNvSpPr txBox="1"/>
+          <p:nvPr/>
+        </p:nvSpPr>
         <p:spPr>
           <a:xfrm>
-            <a:off x="1083310" y="952500"/>
-            <a:ext cx="8688705" cy="5731510"/>
+            <a:off x="888365" y="1524635"/>
+            <a:ext cx="9641205" cy="3784600"/>
           </a:xfrm>
           <a:prstGeom prst="rect">
             <a:avLst/>
           </a:prstGeom>
+          <a:noFill/>
         </p:spPr>
-      </p:pic>
+        <p:txBody>
+          <a:bodyPr wrap="square" rtlCol="0">
+            <a:spAutoFit/>
+          </a:bodyPr>
+          <a:lstStyle/>
+          <a:p>
+            <a:r>
+              <a:rPr lang="en-GB" altLang="en-US" sz="2400" dirty="0">
+                <a:solidFill>
+                  <a:schemeClr val="tx1"/>
+                </a:solidFill>
+                <a:effectLst>
+                  <a:outerShdw blurRad="38100" dist="19050" dir="2700000" algn="tl" rotWithShape="0">
+                    <a:schemeClr val="dk1">
+                      <a:alpha val="40000"/>
+                    </a:schemeClr>
+                  </a:outerShdw>
+                </a:effectLst>
+              </a:rPr>
+              <a:t>Task</a:t>
+            </a:r>
+            <a:endParaRPr lang="en-GB" altLang="en-US" sz="2400" dirty="0">
+              <a:solidFill>
+                <a:schemeClr val="tx1"/>
+              </a:solidFill>
+              <a:effectLst>
+                <a:outerShdw blurRad="38100" dist="19050" dir="2700000" algn="tl" rotWithShape="0">
+                  <a:schemeClr val="dk1">
+                    <a:alpha val="40000"/>
+                  </a:schemeClr>
+                </a:outerShdw>
+              </a:effectLst>
+            </a:endParaRPr>
+          </a:p>
+          <a:p>
+            <a:endParaRPr lang="en-GB" altLang="en-US" sz="2400" dirty="0">
+              <a:solidFill>
+                <a:schemeClr val="tx1"/>
+              </a:solidFill>
+              <a:effectLst>
+                <a:outerShdw blurRad="38100" dist="19050" dir="2700000" algn="tl" rotWithShape="0">
+                  <a:schemeClr val="dk1">
+                    <a:alpha val="40000"/>
+                  </a:schemeClr>
+                </a:outerShdw>
+              </a:effectLst>
+            </a:endParaRPr>
+          </a:p>
+          <a:p>
+            <a:pPr marL="342900" indent="-342900" algn="l">
+              <a:buFont typeface="Wingdings" panose="05000000000000000000" charset="0"/>
+              <a:buChar char="Ø"/>
+            </a:pPr>
+            <a:r>
+              <a:rPr lang="en-GB" altLang="en-IN" sz="2000" dirty="0">
+                <a:sym typeface="+mn-ea"/>
+              </a:rPr>
+              <a:t>To provide a website where anybody can compose a blog anonymously and anybody can read it.</a:t>
+            </a:r>
+            <a:endParaRPr lang="en-GB" altLang="en-IN" sz="2000" dirty="0">
+              <a:sym typeface="+mn-ea"/>
+            </a:endParaRPr>
+          </a:p>
+          <a:p>
+            <a:pPr marL="342900" indent="-342900" algn="l">
+              <a:buFont typeface="Wingdings" panose="05000000000000000000" charset="0"/>
+              <a:buChar char="Ø"/>
+            </a:pPr>
+            <a:endParaRPr lang="en-GB" altLang="en-IN" sz="2000" dirty="0"/>
+          </a:p>
+          <a:p>
+            <a:pPr marL="342900" indent="-342900" algn="l">
+              <a:buFont typeface="Wingdings" panose="05000000000000000000" charset="0"/>
+              <a:buChar char="Ø"/>
+            </a:pPr>
+            <a:r>
+              <a:rPr lang="en-GB" altLang="en-IN" sz="2000" dirty="0">
+                <a:sym typeface="+mn-ea"/>
+              </a:rPr>
+              <a:t>We will also provide the functionality to delete blogs.</a:t>
+            </a:r>
+            <a:endParaRPr lang="en-GB" altLang="en-IN" sz="2000" dirty="0"/>
+          </a:p>
+          <a:p>
+            <a:pPr marL="342900" indent="-342900"/>
+            <a:endParaRPr lang="en-GB" altLang="en-US" sz="2400" dirty="0">
+              <a:solidFill>
+                <a:schemeClr val="tx1"/>
+              </a:solidFill>
+              <a:effectLst>
+                <a:outerShdw blurRad="38100" dist="19050" dir="2700000" algn="tl" rotWithShape="0">
+                  <a:schemeClr val="dk1">
+                    <a:alpha val="40000"/>
+                  </a:schemeClr>
+                </a:outerShdw>
+              </a:effectLst>
+            </a:endParaRPr>
+          </a:p>
+          <a:p>
+            <a:pPr marL="342900" indent="-342900"/>
+            <a:r>
+              <a:rPr lang="en-GB" altLang="en-US" sz="2400" dirty="0">
+                <a:solidFill>
+                  <a:schemeClr val="tx1"/>
+                </a:solidFill>
+                <a:effectLst>
+                  <a:outerShdw blurRad="38100" dist="19050" dir="2700000" algn="tl" rotWithShape="0">
+                    <a:schemeClr val="dk1">
+                      <a:alpha val="40000"/>
+                    </a:schemeClr>
+                  </a:outerShdw>
+                </a:effectLst>
+              </a:rPr>
+              <a:t>Constraint</a:t>
+            </a:r>
+            <a:endParaRPr lang="en-GB" altLang="en-US" sz="2400" dirty="0">
+              <a:solidFill>
+                <a:schemeClr val="tx1"/>
+              </a:solidFill>
+              <a:effectLst>
+                <a:outerShdw blurRad="38100" dist="19050" dir="2700000" algn="tl" rotWithShape="0">
+                  <a:schemeClr val="dk1">
+                    <a:alpha val="40000"/>
+                  </a:schemeClr>
+                </a:outerShdw>
+              </a:effectLst>
+            </a:endParaRPr>
+          </a:p>
+          <a:p>
+            <a:pPr marL="342900" indent="-342900"/>
+            <a:endParaRPr lang="en-GB" altLang="en-US" sz="2400" dirty="0">
+              <a:solidFill>
+                <a:schemeClr val="tx1"/>
+              </a:solidFill>
+              <a:effectLst>
+                <a:outerShdw blurRad="38100" dist="19050" dir="2700000" algn="tl" rotWithShape="0">
+                  <a:schemeClr val="dk1">
+                    <a:alpha val="40000"/>
+                  </a:schemeClr>
+                </a:outerShdw>
+              </a:effectLst>
+            </a:endParaRPr>
+          </a:p>
+          <a:p>
+            <a:pPr marL="342900" indent="-342900">
+              <a:buFont typeface="Wingdings" panose="05000000000000000000" charset="0"/>
+              <a:buChar char="Ø"/>
+            </a:pPr>
+            <a:r>
+              <a:rPr lang="en-GB" altLang="en-US" sz="2000" dirty="0"/>
+              <a:t> There is no account registration hence the blog is public and anybody can </a:t>
+            </a:r>
+            <a:r>
+              <a:rPr lang="en-GB" altLang="en-US" sz="2000" dirty="0" smtClean="0"/>
+              <a:t>read, compose or </a:t>
+            </a:r>
+            <a:r>
+              <a:rPr lang="en-GB" altLang="en-US" sz="2000" dirty="0"/>
+              <a:t>delete blog.</a:t>
+            </a:r>
+            <a:endParaRPr lang="en-GB" altLang="en-US" sz="2000" dirty="0"/>
+          </a:p>
+        </p:txBody>
+      </p:sp>
     </p:spTree>
   </p:cSld>
   <p:clrMapOvr>

</xml_diff>